<commit_message>
updated section 2 of Developer Guide
</commit_message>
<xml_diff>
--- a/docs/diagrams/HighLevelSequenceDiagrams.pptx
+++ b/docs/diagrams/HighLevelSequenceDiagrams.pptx
@@ -107,6 +107,22 @@
       </a:defRPr>
     </a:lvl9pPr>
   </p:defaultTextStyle>
+  <p:extLst>
+    <p:ext uri="{EFAFB233-063F-42B5-8137-9DF3F51BA10A}">
+      <p15:sldGuideLst xmlns:p15="http://schemas.microsoft.com/office/powerpoint/2012/main">
+        <p15:guide id="1" orient="horz" pos="1488">
+          <p15:clr>
+            <a:srgbClr val="A4A3A4"/>
+          </p15:clr>
+        </p15:guide>
+        <p15:guide id="2" pos="2880">
+          <p15:clr>
+            <a:srgbClr val="A4A3A4"/>
+          </p15:clr>
+        </p15:guide>
+      </p15:sldGuideLst>
+    </p:ext>
+  </p:extLst>
 </p:presentation>
 </file>
 
@@ -192,7 +208,7 @@
           <a:p>
             <a:fld id="{F5CC4B3F-88C1-4FFA-B1B6-F41C21DC6924}" type="datetimeFigureOut">
               <a:rPr lang="en-US" smtClean="0"/>
-              <a:t>10/16/2016</a:t>
+              <a:t>9/28/2018</a:t>
             </a:fld>
             <a:endParaRPr lang="en-US"/>
           </a:p>
@@ -641,7 +657,7 @@
           <a:p>
             <a:fld id="{78C97017-6FC3-485B-9764-EAC9E56C1D49}" type="datetimeFigureOut">
               <a:rPr lang="en-US" smtClean="0"/>
-              <a:t>10/16/2016</a:t>
+              <a:t>9/28/2018</a:t>
             </a:fld>
             <a:endParaRPr lang="en-US"/>
           </a:p>
@@ -811,7 +827,7 @@
           <a:p>
             <a:fld id="{78C97017-6FC3-485B-9764-EAC9E56C1D49}" type="datetimeFigureOut">
               <a:rPr lang="en-US" smtClean="0"/>
-              <a:t>10/16/2016</a:t>
+              <a:t>9/28/2018</a:t>
             </a:fld>
             <a:endParaRPr lang="en-US"/>
           </a:p>
@@ -991,7 +1007,7 @@
           <a:p>
             <a:fld id="{78C97017-6FC3-485B-9764-EAC9E56C1D49}" type="datetimeFigureOut">
               <a:rPr lang="en-US" smtClean="0"/>
-              <a:t>10/16/2016</a:t>
+              <a:t>9/28/2018</a:t>
             </a:fld>
             <a:endParaRPr lang="en-US"/>
           </a:p>
@@ -1161,7 +1177,7 @@
           <a:p>
             <a:fld id="{78C97017-6FC3-485B-9764-EAC9E56C1D49}" type="datetimeFigureOut">
               <a:rPr lang="en-US" smtClean="0"/>
-              <a:t>10/16/2016</a:t>
+              <a:t>9/28/2018</a:t>
             </a:fld>
             <a:endParaRPr lang="en-US"/>
           </a:p>
@@ -1407,7 +1423,7 @@
           <a:p>
             <a:fld id="{78C97017-6FC3-485B-9764-EAC9E56C1D49}" type="datetimeFigureOut">
               <a:rPr lang="en-US" smtClean="0"/>
-              <a:t>10/16/2016</a:t>
+              <a:t>9/28/2018</a:t>
             </a:fld>
             <a:endParaRPr lang="en-US"/>
           </a:p>
@@ -1695,7 +1711,7 @@
           <a:p>
             <a:fld id="{78C97017-6FC3-485B-9764-EAC9E56C1D49}" type="datetimeFigureOut">
               <a:rPr lang="en-US" smtClean="0"/>
-              <a:t>10/16/2016</a:t>
+              <a:t>9/28/2018</a:t>
             </a:fld>
             <a:endParaRPr lang="en-US"/>
           </a:p>
@@ -2117,7 +2133,7 @@
           <a:p>
             <a:fld id="{78C97017-6FC3-485B-9764-EAC9E56C1D49}" type="datetimeFigureOut">
               <a:rPr lang="en-US" smtClean="0"/>
-              <a:t>10/16/2016</a:t>
+              <a:t>9/28/2018</a:t>
             </a:fld>
             <a:endParaRPr lang="en-US"/>
           </a:p>
@@ -2235,7 +2251,7 @@
           <a:p>
             <a:fld id="{78C97017-6FC3-485B-9764-EAC9E56C1D49}" type="datetimeFigureOut">
               <a:rPr lang="en-US" smtClean="0"/>
-              <a:t>10/16/2016</a:t>
+              <a:t>9/28/2018</a:t>
             </a:fld>
             <a:endParaRPr lang="en-US"/>
           </a:p>
@@ -2330,7 +2346,7 @@
           <a:p>
             <a:fld id="{78C97017-6FC3-485B-9764-EAC9E56C1D49}" type="datetimeFigureOut">
               <a:rPr lang="en-US" smtClean="0"/>
-              <a:t>10/16/2016</a:t>
+              <a:t>9/28/2018</a:t>
             </a:fld>
             <a:endParaRPr lang="en-US"/>
           </a:p>
@@ -2607,7 +2623,7 @@
           <a:p>
             <a:fld id="{78C97017-6FC3-485B-9764-EAC9E56C1D49}" type="datetimeFigureOut">
               <a:rPr lang="en-US" smtClean="0"/>
-              <a:t>10/16/2016</a:t>
+              <a:t>9/28/2018</a:t>
             </a:fld>
             <a:endParaRPr lang="en-US"/>
           </a:p>
@@ -2860,7 +2876,7 @@
           <a:p>
             <a:fld id="{78C97017-6FC3-485B-9764-EAC9E56C1D49}" type="datetimeFigureOut">
               <a:rPr lang="en-US" smtClean="0"/>
-              <a:t>10/16/2016</a:t>
+              <a:t>9/28/2018</a:t>
             </a:fld>
             <a:endParaRPr lang="en-US"/>
           </a:p>
@@ -3073,7 +3089,7 @@
           <a:p>
             <a:fld id="{78C97017-6FC3-485B-9764-EAC9E56C1D49}" type="datetimeFigureOut">
               <a:rPr lang="en-US" smtClean="0"/>
-              <a:t>10/16/2016</a:t>
+              <a:t>9/28/2018</a:t>
             </a:fld>
             <a:endParaRPr lang="en-US"/>
           </a:p>
@@ -4151,7 +4167,7 @@
         <p:spPr>
           <a:xfrm>
             <a:off x="466818" y="1345880"/>
-            <a:ext cx="860170" cy="215444"/>
+            <a:ext cx="860170" cy="646331"/>
           </a:xfrm>
           <a:prstGeom prst="rect">
             <a:avLst/>
@@ -4166,7 +4182,19 @@
           <a:p>
             <a:r>
               <a:rPr lang="en-US" sz="1400" dirty="0" smtClean="0"/>
-              <a:t>delete 1</a:t>
+              <a:t>delete </a:t>
+            </a:r>
+            <a:r>
+              <a:rPr lang="en-US" sz="1400" dirty="0" smtClean="0"/>
+              <a:t>m/CS2113 </a:t>
+            </a:r>
+            <a:r>
+              <a:rPr lang="en-US" sz="1400" dirty="0" err="1" smtClean="0"/>
+              <a:t>i</a:t>
+            </a:r>
+            <a:r>
+              <a:rPr lang="en-US" sz="1400" dirty="0" smtClean="0"/>
+              <a:t>/1</a:t>
             </a:r>
             <a:endParaRPr lang="en-US" sz="1400" dirty="0"/>
           </a:p>
@@ -4217,7 +4245,7 @@
         <p:spPr>
           <a:xfrm>
             <a:off x="2166172" y="1453379"/>
-            <a:ext cx="1424846" cy="215444"/>
+            <a:ext cx="1424846" cy="430887"/>
           </a:xfrm>
           <a:prstGeom prst="rect">
             <a:avLst/>
@@ -4236,7 +4264,31 @@
                   <a:srgbClr val="0070C0"/>
                 </a:solidFill>
               </a:rPr>
-              <a:t>execute(“delete 1”)</a:t>
+              <a:t>execute(“delete </a:t>
+            </a:r>
+            <a:r>
+              <a:rPr lang="en-US" sz="1400" dirty="0" smtClean="0">
+                <a:solidFill>
+                  <a:srgbClr val="0070C0"/>
+                </a:solidFill>
+              </a:rPr>
+              <a:t>m/CS2113 </a:t>
+            </a:r>
+            <a:r>
+              <a:rPr lang="en-US" sz="1400" dirty="0" err="1" smtClean="0">
+                <a:solidFill>
+                  <a:srgbClr val="0070C0"/>
+                </a:solidFill>
+              </a:rPr>
+              <a:t>i</a:t>
+            </a:r>
+            <a:r>
+              <a:rPr lang="en-US" sz="1400" dirty="0" smtClean="0">
+                <a:solidFill>
+                  <a:srgbClr val="0070C0"/>
+                </a:solidFill>
+              </a:rPr>
+              <a:t>/1”)</a:t>
             </a:r>
             <a:endParaRPr lang="en-US" sz="1400" dirty="0">
               <a:solidFill>
@@ -4310,7 +4362,7 @@
                   <a:srgbClr val="7030A0"/>
                 </a:solidFill>
               </a:rPr>
-              <a:t>deletePerson</a:t>
+              <a:t>deleteThread</a:t>
             </a:r>
             <a:r>
               <a:rPr lang="en-US" sz="1400" dirty="0" smtClean="0">
@@ -4318,7 +4370,23 @@
                   <a:srgbClr val="7030A0"/>
                 </a:solidFill>
               </a:rPr>
-              <a:t>(p)</a:t>
+              <a:t>(m, </a:t>
+            </a:r>
+            <a:r>
+              <a:rPr lang="en-US" sz="1400" dirty="0" err="1" smtClean="0">
+                <a:solidFill>
+                  <a:srgbClr val="7030A0"/>
+                </a:solidFill>
+              </a:rPr>
+              <a:t>i</a:t>
+            </a:r>
+            <a:r>
+              <a:rPr lang="en-US" sz="1400" dirty="0" smtClean="0">
+                <a:solidFill>
+                  <a:srgbClr val="7030A0"/>
+                </a:solidFill>
+              </a:rPr>
+              <a:t>)</a:t>
             </a:r>
             <a:endParaRPr lang="en-US" sz="1400" dirty="0">
               <a:solidFill>
@@ -4368,7 +4436,7 @@
                   </a:schemeClr>
                 </a:solidFill>
               </a:rPr>
-              <a:t>AddressBookChangedEvent</a:t>
+              <a:t>ForumBookChangedEvent</a:t>
             </a:r>
             <a:r>
               <a:rPr lang="en-US" sz="1400" dirty="0" smtClean="0">
@@ -4942,7 +5010,7 @@
                   </a:schemeClr>
                 </a:solidFill>
               </a:rPr>
-              <a:t>AddressBookChangedEvent</a:t>
+              <a:t>ForumBookChangedEvent</a:t>
             </a:r>
             <a:r>
               <a:rPr lang="en-US" sz="1400" dirty="0" smtClean="0">
@@ -5314,7 +5382,7 @@
                   </a:schemeClr>
                 </a:solidFill>
               </a:rPr>
-              <a:t>handleAddresssBookChangedEvent</a:t>
+              <a:t>handleForumBookChangedEvent</a:t>
             </a:r>
             <a:r>
               <a:rPr lang="en-US" sz="1400" dirty="0" smtClean="0">
@@ -5625,7 +5693,7 @@
                   <a:srgbClr val="00B050"/>
                 </a:solidFill>
               </a:rPr>
-              <a:t>handleAddresssBookChangedEvent</a:t>
+              <a:t>handleForumBookChangedEvent</a:t>
             </a:r>
             <a:r>
               <a:rPr lang="en-US" sz="1400" dirty="0" smtClean="0">
@@ -6075,6 +6143,13 @@
   <p:clrMapOvr>
     <a:masterClrMapping/>
   </p:clrMapOvr>
+  <p:timing>
+    <p:tnLst>
+      <p:par>
+        <p:cTn id="1" dur="indefinite" restart="never" nodeType="tmRoot"/>
+      </p:par>
+    </p:tnLst>
+  </p:timing>
 </p:sld>
 </file>
 

</xml_diff>

<commit_message>
updated profile pictures and DeveloperGuide with sequence diagram
</commit_message>
<xml_diff>
--- a/docs/diagrams/HighLevelSequenceDiagrams.pptx
+++ b/docs/diagrams/HighLevelSequenceDiagrams.pptx
@@ -208,7 +208,7 @@
           <a:p>
             <a:fld id="{F5CC4B3F-88C1-4FFA-B1B6-F41C21DC6924}" type="datetimeFigureOut">
               <a:rPr lang="en-US" smtClean="0"/>
-              <a:t>9/28/2018</a:t>
+              <a:t>10/20/18</a:t>
             </a:fld>
             <a:endParaRPr lang="en-US"/>
           </a:p>
@@ -272,38 +272,37 @@
           <a:p>
             <a:pPr lvl="0"/>
             <a:r>
-              <a:rPr lang="en-US" smtClean="0"/>
+              <a:rPr lang="en-US"/>
               <a:t>Click to edit Master text styles</a:t>
             </a:r>
           </a:p>
           <a:p>
             <a:pPr lvl="1"/>
             <a:r>
-              <a:rPr lang="en-US" smtClean="0"/>
+              <a:rPr lang="en-US"/>
               <a:t>Second level</a:t>
             </a:r>
           </a:p>
           <a:p>
             <a:pPr lvl="2"/>
             <a:r>
-              <a:rPr lang="en-US" smtClean="0"/>
+              <a:rPr lang="en-US"/>
               <a:t>Third level</a:t>
             </a:r>
           </a:p>
           <a:p>
             <a:pPr lvl="3"/>
             <a:r>
-              <a:rPr lang="en-US" smtClean="0"/>
+              <a:rPr lang="en-US"/>
               <a:t>Fourth level</a:t>
             </a:r>
           </a:p>
           <a:p>
             <a:pPr lvl="4"/>
             <a:r>
-              <a:rPr lang="en-US" smtClean="0"/>
+              <a:rPr lang="en-US"/>
               <a:t>Fifth level</a:t>
             </a:r>
-            <a:endParaRPr lang="en-US"/>
           </a:p>
         </p:txBody>
       </p:sp>
@@ -514,10 +513,9 @@
           <a:lstStyle/>
           <a:p>
             <a:r>
-              <a:rPr lang="en-US" smtClean="0"/>
+              <a:rPr lang="en-US"/>
               <a:t>Click to edit Master title style</a:t>
             </a:r>
-            <a:endParaRPr lang="en-US"/>
           </a:p>
         </p:txBody>
       </p:sp>
@@ -633,10 +631,9 @@
           </a:lstStyle>
           <a:p>
             <a:r>
-              <a:rPr lang="en-US" smtClean="0"/>
+              <a:rPr lang="en-US"/>
               <a:t>Click to edit Master subtitle style</a:t>
             </a:r>
-            <a:endParaRPr lang="en-US"/>
           </a:p>
         </p:txBody>
       </p:sp>
@@ -657,7 +654,7 @@
           <a:p>
             <a:fld id="{78C97017-6FC3-485B-9764-EAC9E56C1D49}" type="datetimeFigureOut">
               <a:rPr lang="en-US" smtClean="0"/>
-              <a:t>9/28/2018</a:t>
+              <a:t>10/20/18</a:t>
             </a:fld>
             <a:endParaRPr lang="en-US"/>
           </a:p>
@@ -751,10 +748,9 @@
           <a:lstStyle/>
           <a:p>
             <a:r>
-              <a:rPr lang="en-US" smtClean="0"/>
+              <a:rPr lang="en-US"/>
               <a:t>Click to edit Master title style</a:t>
             </a:r>
-            <a:endParaRPr lang="en-US"/>
           </a:p>
         </p:txBody>
       </p:sp>
@@ -775,38 +771,37 @@
           <a:p>
             <a:pPr lvl="0"/>
             <a:r>
-              <a:rPr lang="en-US" smtClean="0"/>
+              <a:rPr lang="en-US"/>
               <a:t>Click to edit Master text styles</a:t>
             </a:r>
           </a:p>
           <a:p>
             <a:pPr lvl="1"/>
             <a:r>
-              <a:rPr lang="en-US" smtClean="0"/>
+              <a:rPr lang="en-US"/>
               <a:t>Second level</a:t>
             </a:r>
           </a:p>
           <a:p>
             <a:pPr lvl="2"/>
             <a:r>
-              <a:rPr lang="en-US" smtClean="0"/>
+              <a:rPr lang="en-US"/>
               <a:t>Third level</a:t>
             </a:r>
           </a:p>
           <a:p>
             <a:pPr lvl="3"/>
             <a:r>
-              <a:rPr lang="en-US" smtClean="0"/>
+              <a:rPr lang="en-US"/>
               <a:t>Fourth level</a:t>
             </a:r>
           </a:p>
           <a:p>
             <a:pPr lvl="4"/>
             <a:r>
-              <a:rPr lang="en-US" smtClean="0"/>
+              <a:rPr lang="en-US"/>
               <a:t>Fifth level</a:t>
             </a:r>
-            <a:endParaRPr lang="en-US"/>
           </a:p>
         </p:txBody>
       </p:sp>
@@ -827,7 +822,7 @@
           <a:p>
             <a:fld id="{78C97017-6FC3-485B-9764-EAC9E56C1D49}" type="datetimeFigureOut">
               <a:rPr lang="en-US" smtClean="0"/>
-              <a:t>9/28/2018</a:t>
+              <a:t>10/20/18</a:t>
             </a:fld>
             <a:endParaRPr lang="en-US"/>
           </a:p>
@@ -926,10 +921,9 @@
           <a:lstStyle/>
           <a:p>
             <a:r>
-              <a:rPr lang="en-US" smtClean="0"/>
+              <a:rPr lang="en-US"/>
               <a:t>Click to edit Master title style</a:t>
             </a:r>
-            <a:endParaRPr lang="en-US"/>
           </a:p>
         </p:txBody>
       </p:sp>
@@ -955,38 +949,37 @@
           <a:p>
             <a:pPr lvl="0"/>
             <a:r>
-              <a:rPr lang="en-US" smtClean="0"/>
+              <a:rPr lang="en-US"/>
               <a:t>Click to edit Master text styles</a:t>
             </a:r>
           </a:p>
           <a:p>
             <a:pPr lvl="1"/>
             <a:r>
-              <a:rPr lang="en-US" smtClean="0"/>
+              <a:rPr lang="en-US"/>
               <a:t>Second level</a:t>
             </a:r>
           </a:p>
           <a:p>
             <a:pPr lvl="2"/>
             <a:r>
-              <a:rPr lang="en-US" smtClean="0"/>
+              <a:rPr lang="en-US"/>
               <a:t>Third level</a:t>
             </a:r>
           </a:p>
           <a:p>
             <a:pPr lvl="3"/>
             <a:r>
-              <a:rPr lang="en-US" smtClean="0"/>
+              <a:rPr lang="en-US"/>
               <a:t>Fourth level</a:t>
             </a:r>
           </a:p>
           <a:p>
             <a:pPr lvl="4"/>
             <a:r>
-              <a:rPr lang="en-US" smtClean="0"/>
+              <a:rPr lang="en-US"/>
               <a:t>Fifth level</a:t>
             </a:r>
-            <a:endParaRPr lang="en-US"/>
           </a:p>
         </p:txBody>
       </p:sp>
@@ -1007,7 +1000,7 @@
           <a:p>
             <a:fld id="{78C97017-6FC3-485B-9764-EAC9E56C1D49}" type="datetimeFigureOut">
               <a:rPr lang="en-US" smtClean="0"/>
-              <a:t>9/28/2018</a:t>
+              <a:t>10/20/18</a:t>
             </a:fld>
             <a:endParaRPr lang="en-US"/>
           </a:p>
@@ -1101,10 +1094,9 @@
           <a:lstStyle/>
           <a:p>
             <a:r>
-              <a:rPr lang="en-US" smtClean="0"/>
+              <a:rPr lang="en-US"/>
               <a:t>Click to edit Master title style</a:t>
             </a:r>
-            <a:endParaRPr lang="en-US"/>
           </a:p>
         </p:txBody>
       </p:sp>
@@ -1125,38 +1117,37 @@
           <a:p>
             <a:pPr lvl="0"/>
             <a:r>
-              <a:rPr lang="en-US" smtClean="0"/>
+              <a:rPr lang="en-US"/>
               <a:t>Click to edit Master text styles</a:t>
             </a:r>
           </a:p>
           <a:p>
             <a:pPr lvl="1"/>
             <a:r>
-              <a:rPr lang="en-US" smtClean="0"/>
+              <a:rPr lang="en-US"/>
               <a:t>Second level</a:t>
             </a:r>
           </a:p>
           <a:p>
             <a:pPr lvl="2"/>
             <a:r>
-              <a:rPr lang="en-US" smtClean="0"/>
+              <a:rPr lang="en-US"/>
               <a:t>Third level</a:t>
             </a:r>
           </a:p>
           <a:p>
             <a:pPr lvl="3"/>
             <a:r>
-              <a:rPr lang="en-US" smtClean="0"/>
+              <a:rPr lang="en-US"/>
               <a:t>Fourth level</a:t>
             </a:r>
           </a:p>
           <a:p>
             <a:pPr lvl="4"/>
             <a:r>
-              <a:rPr lang="en-US" smtClean="0"/>
+              <a:rPr lang="en-US"/>
               <a:t>Fifth level</a:t>
             </a:r>
-            <a:endParaRPr lang="en-US"/>
           </a:p>
         </p:txBody>
       </p:sp>
@@ -1177,7 +1168,7 @@
           <a:p>
             <a:fld id="{78C97017-6FC3-485B-9764-EAC9E56C1D49}" type="datetimeFigureOut">
               <a:rPr lang="en-US" smtClean="0"/>
-              <a:t>9/28/2018</a:t>
+              <a:t>10/20/18</a:t>
             </a:fld>
             <a:endParaRPr lang="en-US"/>
           </a:p>
@@ -1280,10 +1271,9 @@
           </a:lstStyle>
           <a:p>
             <a:r>
-              <a:rPr lang="en-US" smtClean="0"/>
+              <a:rPr lang="en-US"/>
               <a:t>Click to edit Master title style</a:t>
             </a:r>
-            <a:endParaRPr lang="en-US"/>
           </a:p>
         </p:txBody>
       </p:sp>
@@ -1400,7 +1390,7 @@
           <a:p>
             <a:pPr lvl="0"/>
             <a:r>
-              <a:rPr lang="en-US" smtClean="0"/>
+              <a:rPr lang="en-US"/>
               <a:t>Click to edit Master text styles</a:t>
             </a:r>
           </a:p>
@@ -1423,7 +1413,7 @@
           <a:p>
             <a:fld id="{78C97017-6FC3-485B-9764-EAC9E56C1D49}" type="datetimeFigureOut">
               <a:rPr lang="en-US" smtClean="0"/>
-              <a:t>9/28/2018</a:t>
+              <a:t>10/20/18</a:t>
             </a:fld>
             <a:endParaRPr lang="en-US"/>
           </a:p>
@@ -1517,10 +1507,9 @@
           <a:lstStyle/>
           <a:p>
             <a:r>
-              <a:rPr lang="en-US" smtClean="0"/>
+              <a:rPr lang="en-US"/>
               <a:t>Click to edit Master title style</a:t>
             </a:r>
-            <a:endParaRPr lang="en-US"/>
           </a:p>
         </p:txBody>
       </p:sp>
@@ -1574,38 +1563,37 @@
           <a:p>
             <a:pPr lvl="0"/>
             <a:r>
-              <a:rPr lang="en-US" smtClean="0"/>
+              <a:rPr lang="en-US"/>
               <a:t>Click to edit Master text styles</a:t>
             </a:r>
           </a:p>
           <a:p>
             <a:pPr lvl="1"/>
             <a:r>
-              <a:rPr lang="en-US" smtClean="0"/>
+              <a:rPr lang="en-US"/>
               <a:t>Second level</a:t>
             </a:r>
           </a:p>
           <a:p>
             <a:pPr lvl="2"/>
             <a:r>
-              <a:rPr lang="en-US" smtClean="0"/>
+              <a:rPr lang="en-US"/>
               <a:t>Third level</a:t>
             </a:r>
           </a:p>
           <a:p>
             <a:pPr lvl="3"/>
             <a:r>
-              <a:rPr lang="en-US" smtClean="0"/>
+              <a:rPr lang="en-US"/>
               <a:t>Fourth level</a:t>
             </a:r>
           </a:p>
           <a:p>
             <a:pPr lvl="4"/>
             <a:r>
-              <a:rPr lang="en-US" smtClean="0"/>
+              <a:rPr lang="en-US"/>
               <a:t>Fifth level</a:t>
             </a:r>
-            <a:endParaRPr lang="en-US"/>
           </a:p>
         </p:txBody>
       </p:sp>
@@ -1659,38 +1647,37 @@
           <a:p>
             <a:pPr lvl="0"/>
             <a:r>
-              <a:rPr lang="en-US" smtClean="0"/>
+              <a:rPr lang="en-US"/>
               <a:t>Click to edit Master text styles</a:t>
             </a:r>
           </a:p>
           <a:p>
             <a:pPr lvl="1"/>
             <a:r>
-              <a:rPr lang="en-US" smtClean="0"/>
+              <a:rPr lang="en-US"/>
               <a:t>Second level</a:t>
             </a:r>
           </a:p>
           <a:p>
             <a:pPr lvl="2"/>
             <a:r>
-              <a:rPr lang="en-US" smtClean="0"/>
+              <a:rPr lang="en-US"/>
               <a:t>Third level</a:t>
             </a:r>
           </a:p>
           <a:p>
             <a:pPr lvl="3"/>
             <a:r>
-              <a:rPr lang="en-US" smtClean="0"/>
+              <a:rPr lang="en-US"/>
               <a:t>Fourth level</a:t>
             </a:r>
           </a:p>
           <a:p>
             <a:pPr lvl="4"/>
             <a:r>
-              <a:rPr lang="en-US" smtClean="0"/>
+              <a:rPr lang="en-US"/>
               <a:t>Fifth level</a:t>
             </a:r>
-            <a:endParaRPr lang="en-US"/>
           </a:p>
         </p:txBody>
       </p:sp>
@@ -1711,7 +1698,7 @@
           <a:p>
             <a:fld id="{78C97017-6FC3-485B-9764-EAC9E56C1D49}" type="datetimeFigureOut">
               <a:rPr lang="en-US" smtClean="0"/>
-              <a:t>9/28/2018</a:t>
+              <a:t>10/20/18</a:t>
             </a:fld>
             <a:endParaRPr lang="en-US"/>
           </a:p>
@@ -1809,10 +1796,9 @@
           </a:lstStyle>
           <a:p>
             <a:r>
-              <a:rPr lang="en-US" smtClean="0"/>
+              <a:rPr lang="en-US"/>
               <a:t>Click to edit Master title style</a:t>
             </a:r>
-            <a:endParaRPr lang="en-US"/>
           </a:p>
         </p:txBody>
       </p:sp>
@@ -1875,7 +1861,7 @@
           <a:p>
             <a:pPr lvl="0"/>
             <a:r>
-              <a:rPr lang="en-US" smtClean="0"/>
+              <a:rPr lang="en-US"/>
               <a:t>Click to edit Master text styles</a:t>
             </a:r>
           </a:p>
@@ -1931,38 +1917,37 @@
           <a:p>
             <a:pPr lvl="0"/>
             <a:r>
-              <a:rPr lang="en-US" smtClean="0"/>
+              <a:rPr lang="en-US"/>
               <a:t>Click to edit Master text styles</a:t>
             </a:r>
           </a:p>
           <a:p>
             <a:pPr lvl="1"/>
             <a:r>
-              <a:rPr lang="en-US" smtClean="0"/>
+              <a:rPr lang="en-US"/>
               <a:t>Second level</a:t>
             </a:r>
           </a:p>
           <a:p>
             <a:pPr lvl="2"/>
             <a:r>
-              <a:rPr lang="en-US" smtClean="0"/>
+              <a:rPr lang="en-US"/>
               <a:t>Third level</a:t>
             </a:r>
           </a:p>
           <a:p>
             <a:pPr lvl="3"/>
             <a:r>
-              <a:rPr lang="en-US" smtClean="0"/>
+              <a:rPr lang="en-US"/>
               <a:t>Fourth level</a:t>
             </a:r>
           </a:p>
           <a:p>
             <a:pPr lvl="4"/>
             <a:r>
-              <a:rPr lang="en-US" smtClean="0"/>
+              <a:rPr lang="en-US"/>
               <a:t>Fifth level</a:t>
             </a:r>
-            <a:endParaRPr lang="en-US"/>
           </a:p>
         </p:txBody>
       </p:sp>
@@ -2025,7 +2010,7 @@
           <a:p>
             <a:pPr lvl="0"/>
             <a:r>
-              <a:rPr lang="en-US" smtClean="0"/>
+              <a:rPr lang="en-US"/>
               <a:t>Click to edit Master text styles</a:t>
             </a:r>
           </a:p>
@@ -2081,38 +2066,37 @@
           <a:p>
             <a:pPr lvl="0"/>
             <a:r>
-              <a:rPr lang="en-US" smtClean="0"/>
+              <a:rPr lang="en-US"/>
               <a:t>Click to edit Master text styles</a:t>
             </a:r>
           </a:p>
           <a:p>
             <a:pPr lvl="1"/>
             <a:r>
-              <a:rPr lang="en-US" smtClean="0"/>
+              <a:rPr lang="en-US"/>
               <a:t>Second level</a:t>
             </a:r>
           </a:p>
           <a:p>
             <a:pPr lvl="2"/>
             <a:r>
-              <a:rPr lang="en-US" smtClean="0"/>
+              <a:rPr lang="en-US"/>
               <a:t>Third level</a:t>
             </a:r>
           </a:p>
           <a:p>
             <a:pPr lvl="3"/>
             <a:r>
-              <a:rPr lang="en-US" smtClean="0"/>
+              <a:rPr lang="en-US"/>
               <a:t>Fourth level</a:t>
             </a:r>
           </a:p>
           <a:p>
             <a:pPr lvl="4"/>
             <a:r>
-              <a:rPr lang="en-US" smtClean="0"/>
+              <a:rPr lang="en-US"/>
               <a:t>Fifth level</a:t>
             </a:r>
-            <a:endParaRPr lang="en-US"/>
           </a:p>
         </p:txBody>
       </p:sp>
@@ -2133,7 +2117,7 @@
           <a:p>
             <a:fld id="{78C97017-6FC3-485B-9764-EAC9E56C1D49}" type="datetimeFigureOut">
               <a:rPr lang="en-US" smtClean="0"/>
-              <a:t>9/28/2018</a:t>
+              <a:t>10/20/18</a:t>
             </a:fld>
             <a:endParaRPr lang="en-US"/>
           </a:p>
@@ -2227,10 +2211,9 @@
           <a:lstStyle/>
           <a:p>
             <a:r>
-              <a:rPr lang="en-US" smtClean="0"/>
+              <a:rPr lang="en-US"/>
               <a:t>Click to edit Master title style</a:t>
             </a:r>
-            <a:endParaRPr lang="en-US"/>
           </a:p>
         </p:txBody>
       </p:sp>
@@ -2251,7 +2234,7 @@
           <a:p>
             <a:fld id="{78C97017-6FC3-485B-9764-EAC9E56C1D49}" type="datetimeFigureOut">
               <a:rPr lang="en-US" smtClean="0"/>
-              <a:t>9/28/2018</a:t>
+              <a:t>10/20/18</a:t>
             </a:fld>
             <a:endParaRPr lang="en-US"/>
           </a:p>
@@ -2346,7 +2329,7 @@
           <a:p>
             <a:fld id="{78C97017-6FC3-485B-9764-EAC9E56C1D49}" type="datetimeFigureOut">
               <a:rPr lang="en-US" smtClean="0"/>
-              <a:t>9/28/2018</a:t>
+              <a:t>10/20/18</a:t>
             </a:fld>
             <a:endParaRPr lang="en-US"/>
           </a:p>
@@ -2449,10 +2432,9 @@
           </a:lstStyle>
           <a:p>
             <a:r>
-              <a:rPr lang="en-US" smtClean="0"/>
+              <a:rPr lang="en-US"/>
               <a:t>Click to edit Master title style</a:t>
             </a:r>
-            <a:endParaRPr lang="en-US"/>
           </a:p>
         </p:txBody>
       </p:sp>
@@ -2506,38 +2488,37 @@
           <a:p>
             <a:pPr lvl="0"/>
             <a:r>
-              <a:rPr lang="en-US" smtClean="0"/>
+              <a:rPr lang="en-US"/>
               <a:t>Click to edit Master text styles</a:t>
             </a:r>
           </a:p>
           <a:p>
             <a:pPr lvl="1"/>
             <a:r>
-              <a:rPr lang="en-US" smtClean="0"/>
+              <a:rPr lang="en-US"/>
               <a:t>Second level</a:t>
             </a:r>
           </a:p>
           <a:p>
             <a:pPr lvl="2"/>
             <a:r>
-              <a:rPr lang="en-US" smtClean="0"/>
+              <a:rPr lang="en-US"/>
               <a:t>Third level</a:t>
             </a:r>
           </a:p>
           <a:p>
             <a:pPr lvl="3"/>
             <a:r>
-              <a:rPr lang="en-US" smtClean="0"/>
+              <a:rPr lang="en-US"/>
               <a:t>Fourth level</a:t>
             </a:r>
           </a:p>
           <a:p>
             <a:pPr lvl="4"/>
             <a:r>
-              <a:rPr lang="en-US" smtClean="0"/>
+              <a:rPr lang="en-US"/>
               <a:t>Fifth level</a:t>
             </a:r>
-            <a:endParaRPr lang="en-US"/>
           </a:p>
         </p:txBody>
       </p:sp>
@@ -2600,7 +2581,7 @@
           <a:p>
             <a:pPr lvl="0"/>
             <a:r>
-              <a:rPr lang="en-US" smtClean="0"/>
+              <a:rPr lang="en-US"/>
               <a:t>Click to edit Master text styles</a:t>
             </a:r>
           </a:p>
@@ -2623,7 +2604,7 @@
           <a:p>
             <a:fld id="{78C97017-6FC3-485B-9764-EAC9E56C1D49}" type="datetimeFigureOut">
               <a:rPr lang="en-US" smtClean="0"/>
-              <a:t>9/28/2018</a:t>
+              <a:t>10/20/18</a:t>
             </a:fld>
             <a:endParaRPr lang="en-US"/>
           </a:p>
@@ -2726,10 +2707,9 @@
           </a:lstStyle>
           <a:p>
             <a:r>
-              <a:rPr lang="en-US" smtClean="0"/>
+              <a:rPr lang="en-US"/>
               <a:t>Click to edit Master title style</a:t>
             </a:r>
-            <a:endParaRPr lang="en-US"/>
           </a:p>
         </p:txBody>
       </p:sp>
@@ -2853,7 +2833,7 @@
           <a:p>
             <a:pPr lvl="0"/>
             <a:r>
-              <a:rPr lang="en-US" smtClean="0"/>
+              <a:rPr lang="en-US"/>
               <a:t>Click to edit Master text styles</a:t>
             </a:r>
           </a:p>
@@ -2876,7 +2856,7 @@
           <a:p>
             <a:fld id="{78C97017-6FC3-485B-9764-EAC9E56C1D49}" type="datetimeFigureOut">
               <a:rPr lang="en-US" smtClean="0"/>
-              <a:t>9/28/2018</a:t>
+              <a:t>10/20/18</a:t>
             </a:fld>
             <a:endParaRPr lang="en-US"/>
           </a:p>
@@ -2985,10 +2965,9 @@
           <a:lstStyle/>
           <a:p>
             <a:r>
-              <a:rPr lang="en-US" smtClean="0"/>
+              <a:rPr lang="en-US"/>
               <a:t>Click to edit Master title style</a:t>
             </a:r>
-            <a:endParaRPr lang="en-US"/>
           </a:p>
         </p:txBody>
       </p:sp>
@@ -3019,38 +2998,37 @@
           <a:p>
             <a:pPr lvl="0"/>
             <a:r>
-              <a:rPr lang="en-US" smtClean="0"/>
+              <a:rPr lang="en-US"/>
               <a:t>Click to edit Master text styles</a:t>
             </a:r>
           </a:p>
           <a:p>
             <a:pPr lvl="1"/>
             <a:r>
-              <a:rPr lang="en-US" smtClean="0"/>
+              <a:rPr lang="en-US"/>
               <a:t>Second level</a:t>
             </a:r>
           </a:p>
           <a:p>
             <a:pPr lvl="2"/>
             <a:r>
-              <a:rPr lang="en-US" smtClean="0"/>
+              <a:rPr lang="en-US"/>
               <a:t>Third level</a:t>
             </a:r>
           </a:p>
           <a:p>
             <a:pPr lvl="3"/>
             <a:r>
-              <a:rPr lang="en-US" smtClean="0"/>
+              <a:rPr lang="en-US"/>
               <a:t>Fourth level</a:t>
             </a:r>
           </a:p>
           <a:p>
             <a:pPr lvl="4"/>
             <a:r>
-              <a:rPr lang="en-US" smtClean="0"/>
+              <a:rPr lang="en-US"/>
               <a:t>Fifth level</a:t>
             </a:r>
-            <a:endParaRPr lang="en-US"/>
           </a:p>
         </p:txBody>
       </p:sp>
@@ -3089,7 +3067,7 @@
           <a:p>
             <a:fld id="{78C97017-6FC3-485B-9764-EAC9E56C1D49}" type="datetimeFigureOut">
               <a:rPr lang="en-US" smtClean="0"/>
-              <a:t>9/28/2018</a:t>
+              <a:t>10/20/18</a:t>
             </a:fld>
             <a:endParaRPr lang="en-US"/>
           </a:p>
@@ -3508,7 +3486,7 @@
           <a:p>
             <a:pPr algn="ctr"/>
             <a:r>
-              <a:rPr lang="en-US" sz="1600" dirty="0" smtClean="0">
+              <a:rPr lang="en-US" sz="1600" dirty="0">
                 <a:solidFill>
                   <a:schemeClr val="bg1"/>
                 </a:solidFill>
@@ -3568,8 +3546,8 @@
         </p:nvSpPr>
         <p:spPr>
           <a:xfrm>
-            <a:off x="1586669" y="1322292"/>
-            <a:ext cx="152400" cy="1019910"/>
+            <a:off x="1586669" y="1143001"/>
+            <a:ext cx="152400" cy="1338318"/>
           </a:xfrm>
           <a:prstGeom prst="rect">
             <a:avLst/>
@@ -3836,7 +3814,7 @@
         </p:nvSpPr>
         <p:spPr>
           <a:xfrm>
-            <a:off x="3335583" y="611613"/>
+            <a:off x="2977410" y="606177"/>
             <a:ext cx="1093635" cy="346760"/>
           </a:xfrm>
           <a:prstGeom prst="rect">
@@ -3872,7 +3850,7 @@
           <a:p>
             <a:pPr algn="ctr"/>
             <a:r>
-              <a:rPr lang="en-US" sz="1600" dirty="0" smtClean="0">
+              <a:rPr lang="en-US" sz="1600" dirty="0">
                 <a:solidFill>
                   <a:schemeClr val="bg1"/>
                 </a:solidFill>
@@ -3895,7 +3873,7 @@
         </p:nvCxnSpPr>
         <p:spPr>
           <a:xfrm>
-            <a:off x="3882400" y="975284"/>
+            <a:off x="3524227" y="969848"/>
             <a:ext cx="0" cy="1723059"/>
           </a:xfrm>
           <a:prstGeom prst="line">
@@ -3932,8 +3910,8 @@
         </p:nvSpPr>
         <p:spPr>
           <a:xfrm>
-            <a:off x="3810392" y="1433477"/>
-            <a:ext cx="144016" cy="832525"/>
+            <a:off x="3452219" y="1277085"/>
+            <a:ext cx="153812" cy="1204234"/>
           </a:xfrm>
           <a:prstGeom prst="rect">
             <a:avLst/>
@@ -3983,8 +3961,8 @@
         </p:nvSpPr>
         <p:spPr>
           <a:xfrm>
-            <a:off x="5316783" y="607926"/>
-            <a:ext cx="1093635" cy="346760"/>
+            <a:off x="6002583" y="595750"/>
+            <a:ext cx="1236417" cy="346760"/>
           </a:xfrm>
           <a:prstGeom prst="rect">
             <a:avLst/>
@@ -4019,12 +3997,20 @@
           <a:p>
             <a:pPr algn="ctr"/>
             <a:r>
-              <a:rPr lang="en-US" sz="1600" dirty="0" smtClean="0">
+              <a:rPr lang="en-US" sz="1600" dirty="0">
                 <a:solidFill>
                   <a:schemeClr val="bg1"/>
                 </a:solidFill>
               </a:rPr>
-              <a:t>:Model</a:t>
+              <a:t>:</a:t>
+            </a:r>
+            <a:r>
+              <a:rPr lang="en-US" sz="1600" dirty="0" err="1">
+                <a:solidFill>
+                  <a:schemeClr val="bg1"/>
+                </a:solidFill>
+              </a:rPr>
+              <a:t>UnitOfWork</a:t>
             </a:r>
             <a:endParaRPr lang="en-SG" sz="1600" dirty="0">
               <a:solidFill>
@@ -4042,7 +4028,7 @@
         </p:nvCxnSpPr>
         <p:spPr>
           <a:xfrm>
-            <a:off x="5863600" y="971597"/>
+            <a:off x="6625600" y="959421"/>
             <a:ext cx="0" cy="1723059"/>
           </a:xfrm>
           <a:prstGeom prst="line">
@@ -4079,8 +4065,8 @@
         </p:nvSpPr>
         <p:spPr>
           <a:xfrm>
-            <a:off x="5791592" y="1538408"/>
-            <a:ext cx="142006" cy="651394"/>
+            <a:off x="6553592" y="2057400"/>
+            <a:ext cx="142006" cy="423919"/>
           </a:xfrm>
           <a:prstGeom prst="rect">
             <a:avLst/>
@@ -4130,7 +4116,7 @@
         </p:nvCxnSpPr>
         <p:spPr>
           <a:xfrm>
-            <a:off x="466818" y="1325979"/>
+            <a:off x="466818" y="1143000"/>
             <a:ext cx="1119851" cy="0"/>
           </a:xfrm>
           <a:prstGeom prst="straightConnector1">
@@ -4166,8 +4152,8 @@
         </p:nvSpPr>
         <p:spPr>
           <a:xfrm>
-            <a:off x="466818" y="1345880"/>
-            <a:ext cx="860170" cy="646331"/>
+            <a:off x="466817" y="1162901"/>
+            <a:ext cx="1072003" cy="646331"/>
           </a:xfrm>
           <a:prstGeom prst="rect">
             <a:avLst/>
@@ -4181,35 +4167,36 @@
           <a:lstStyle/>
           <a:p>
             <a:r>
-              <a:rPr lang="en-US" sz="1400" dirty="0" smtClean="0"/>
-              <a:t>delete </a:t>
-            </a:r>
-            <a:r>
-              <a:rPr lang="en-US" sz="1400" dirty="0" smtClean="0"/>
-              <a:t>m/CS2113 </a:t>
-            </a:r>
-            <a:r>
-              <a:rPr lang="en-US" sz="1400" dirty="0" err="1" smtClean="0"/>
-              <a:t>i</a:t>
-            </a:r>
-            <a:r>
-              <a:rPr lang="en-US" sz="1400" dirty="0" smtClean="0"/>
-              <a:t>/1</a:t>
-            </a:r>
-            <a:endParaRPr lang="en-US" sz="1400" dirty="0"/>
+              <a:rPr lang="en-US" sz="1400" dirty="0" err="1"/>
+              <a:t>setAdmin</a:t>
+            </a:r>
+            <a:r>
+              <a:rPr lang="en-US" sz="1400" dirty="0"/>
+              <a:t> </a:t>
+            </a:r>
+            <a:r>
+              <a:rPr lang="en-US" sz="1400" dirty="0" err="1"/>
+              <a:t>uName</a:t>
+            </a:r>
+            <a:r>
+              <a:rPr lang="en-US" sz="1400" dirty="0"/>
+              <a:t>/john set/true</a:t>
+            </a:r>
           </a:p>
         </p:txBody>
       </p:sp>
       <p:cxnSp>
         <p:nvCxnSpPr>
           <p:cNvPr id="25" name="Straight Arrow Connector 24"/>
-          <p:cNvCxnSpPr/>
+          <p:cNvCxnSpPr>
+            <a:cxnSpLocks/>
+          </p:cNvCxnSpPr>
           <p:nvPr/>
         </p:nvCxnSpPr>
         <p:spPr>
           <a:xfrm>
-            <a:off x="1739069" y="1433478"/>
-            <a:ext cx="2071323" cy="0"/>
+            <a:off x="1739069" y="1277085"/>
+            <a:ext cx="1713150" cy="0"/>
           </a:xfrm>
           <a:prstGeom prst="straightConnector1">
             <a:avLst/>
@@ -4244,8 +4231,8 @@
         </p:nvSpPr>
         <p:spPr>
           <a:xfrm>
-            <a:off x="2166172" y="1453379"/>
-            <a:ext cx="1424846" cy="430887"/>
+            <a:off x="1926220" y="1293071"/>
+            <a:ext cx="1420056" cy="646331"/>
           </a:xfrm>
           <a:prstGeom prst="rect">
             <a:avLst/>
@@ -4259,36 +4246,20 @@
           <a:lstStyle/>
           <a:p>
             <a:r>
-              <a:rPr lang="en-US" sz="1400" dirty="0" smtClean="0">
+              <a:rPr lang="en-US" sz="1400" dirty="0">
                 <a:solidFill>
                   <a:srgbClr val="0070C0"/>
                 </a:solidFill>
               </a:rPr>
-              <a:t>execute(“delete </a:t>
-            </a:r>
-            <a:r>
-              <a:rPr lang="en-US" sz="1400" dirty="0" smtClean="0">
+              <a:t>execute(“</a:t>
+            </a:r>
+            <a:r>
+              <a:rPr lang="en-US" sz="1400" dirty="0" err="1">
                 <a:solidFill>
                   <a:srgbClr val="0070C0"/>
                 </a:solidFill>
               </a:rPr>
-              <a:t>m/CS2113 </a:t>
-            </a:r>
-            <a:r>
-              <a:rPr lang="en-US" sz="1400" dirty="0" err="1" smtClean="0">
-                <a:solidFill>
-                  <a:srgbClr val="0070C0"/>
-                </a:solidFill>
-              </a:rPr>
-              <a:t>i</a:t>
-            </a:r>
-            <a:r>
-              <a:rPr lang="en-US" sz="1400" dirty="0" smtClean="0">
-                <a:solidFill>
-                  <a:srgbClr val="0070C0"/>
-                </a:solidFill>
-              </a:rPr>
-              <a:t>/1”)</a:t>
+              <a:t>setAdmin</a:t>
             </a:r>
             <a:endParaRPr lang="en-US" sz="1400" dirty="0">
               <a:solidFill>
@@ -4296,18 +4267,46 @@
               </a:solidFill>
             </a:endParaRPr>
           </a:p>
+          <a:p>
+            <a:r>
+              <a:rPr lang="en-US" sz="1400" dirty="0">
+                <a:solidFill>
+                  <a:srgbClr val="0070C0"/>
+                </a:solidFill>
+              </a:rPr>
+              <a:t> </a:t>
+            </a:r>
+            <a:r>
+              <a:rPr lang="en-US" sz="1400" dirty="0" err="1">
+                <a:solidFill>
+                  <a:srgbClr val="0070C0"/>
+                </a:solidFill>
+              </a:rPr>
+              <a:t>uName</a:t>
+            </a:r>
+            <a:r>
+              <a:rPr lang="en-US" sz="1400" dirty="0">
+                <a:solidFill>
+                  <a:srgbClr val="0070C0"/>
+                </a:solidFill>
+              </a:rPr>
+              <a:t>/john” set/true)</a:t>
+            </a:r>
+          </a:p>
         </p:txBody>
       </p:sp>
       <p:cxnSp>
         <p:nvCxnSpPr>
           <p:cNvPr id="28" name="Straight Arrow Connector 27"/>
-          <p:cNvCxnSpPr/>
+          <p:cNvCxnSpPr>
+            <a:cxnSpLocks/>
+          </p:cNvCxnSpPr>
           <p:nvPr/>
         </p:nvCxnSpPr>
         <p:spPr>
           <a:xfrm>
-            <a:off x="3954408" y="1538409"/>
-            <a:ext cx="1837184" cy="0"/>
+            <a:off x="3581400" y="1371599"/>
+            <a:ext cx="1454930" cy="0"/>
           </a:xfrm>
           <a:prstGeom prst="straightConnector1">
             <a:avLst/>
@@ -4342,7 +4341,7 @@
         </p:nvSpPr>
         <p:spPr>
           <a:xfrm>
-            <a:off x="4299772" y="1542583"/>
+            <a:off x="3711974" y="1362124"/>
             <a:ext cx="1424846" cy="215444"/>
           </a:xfrm>
           <a:prstGeom prst="rect">
@@ -4357,42 +4356,21 @@
           <a:lstStyle/>
           <a:p>
             <a:r>
-              <a:rPr lang="en-US" sz="1400" dirty="0" err="1" smtClean="0">
+              <a:rPr lang="en-US" sz="1400" dirty="0" err="1">
                 <a:solidFill>
-                  <a:srgbClr val="7030A0"/>
+                  <a:srgbClr val="E46D39"/>
                 </a:solidFill>
               </a:rPr>
-              <a:t>deleteThread</a:t>
-            </a:r>
-            <a:r>
-              <a:rPr lang="en-US" sz="1400" dirty="0" smtClean="0">
+              <a:t>setAdmin</a:t>
+            </a:r>
+            <a:r>
+              <a:rPr lang="en-US" sz="1400" dirty="0">
                 <a:solidFill>
-                  <a:srgbClr val="7030A0"/>
+                  <a:srgbClr val="E46D39"/>
                 </a:solidFill>
               </a:rPr>
-              <a:t>(m, </a:t>
-            </a:r>
-            <a:r>
-              <a:rPr lang="en-US" sz="1400" dirty="0" err="1" smtClean="0">
-                <a:solidFill>
-                  <a:srgbClr val="7030A0"/>
-                </a:solidFill>
-              </a:rPr>
-              <a:t>i</a:t>
-            </a:r>
-            <a:r>
-              <a:rPr lang="en-US" sz="1400" dirty="0" smtClean="0">
-                <a:solidFill>
-                  <a:srgbClr val="7030A0"/>
-                </a:solidFill>
-              </a:rPr>
-              <a:t>)</a:t>
-            </a:r>
-            <a:endParaRPr lang="en-US" sz="1400" dirty="0">
-              <a:solidFill>
-                <a:srgbClr val="7030A0"/>
-              </a:solidFill>
-            </a:endParaRPr>
+              <a:t>(true)</a:t>
+            </a:r>
           </a:p>
         </p:txBody>
       </p:sp>
@@ -4404,8 +4382,8 @@
         </p:nvSpPr>
         <p:spPr>
           <a:xfrm>
-            <a:off x="6074030" y="1687656"/>
-            <a:ext cx="2438400" cy="215444"/>
+            <a:off x="7086599" y="1929731"/>
+            <a:ext cx="754785" cy="215444"/>
           </a:xfrm>
           <a:prstGeom prst="rect">
             <a:avLst/>
@@ -4419,62 +4397,37 @@
           <a:lstStyle/>
           <a:p>
             <a:r>
-              <a:rPr lang="en-US" sz="1400" dirty="0" smtClean="0">
+              <a:rPr lang="en-US" sz="1400" dirty="0">
                 <a:solidFill>
                   <a:schemeClr val="accent5">
                     <a:lumMod val="75000"/>
                   </a:schemeClr>
                 </a:solidFill>
               </a:rPr>
-              <a:t>post(</a:t>
-            </a:r>
-            <a:r>
-              <a:rPr lang="en-US" sz="1400" dirty="0" err="1" smtClean="0">
-                <a:solidFill>
-                  <a:schemeClr val="accent5">
-                    <a:lumMod val="75000"/>
-                  </a:schemeClr>
-                </a:solidFill>
-              </a:rPr>
-              <a:t>ForumBookChangedEvent</a:t>
-            </a:r>
-            <a:r>
-              <a:rPr lang="en-US" sz="1400" dirty="0" smtClean="0">
-                <a:solidFill>
-                  <a:schemeClr val="accent5">
-                    <a:lumMod val="75000"/>
-                  </a:schemeClr>
-                </a:solidFill>
-              </a:rPr>
-              <a:t>)</a:t>
-            </a:r>
-            <a:endParaRPr lang="en-US" sz="1400" dirty="0">
-              <a:solidFill>
-                <a:schemeClr val="accent5">
-                  <a:lumMod val="75000"/>
-                </a:schemeClr>
-              </a:solidFill>
-            </a:endParaRPr>
+              <a:t>commit()</a:t>
+            </a:r>
           </a:p>
         </p:txBody>
       </p:sp>
       <p:cxnSp>
         <p:nvCxnSpPr>
           <p:cNvPr id="34" name="Straight Arrow Connector 33"/>
-          <p:cNvCxnSpPr/>
+          <p:cNvCxnSpPr>
+            <a:cxnSpLocks/>
+          </p:cNvCxnSpPr>
           <p:nvPr/>
         </p:nvCxnSpPr>
         <p:spPr>
           <a:xfrm>
-            <a:off x="3954408" y="2190681"/>
-            <a:ext cx="1837184" cy="0"/>
+            <a:off x="3581400" y="1752599"/>
+            <a:ext cx="1454930" cy="0"/>
           </a:xfrm>
           <a:prstGeom prst="straightConnector1">
             <a:avLst/>
           </a:prstGeom>
           <a:ln w="19050">
             <a:solidFill>
-              <a:srgbClr val="7030A0"/>
+              <a:srgbClr val="E46D39"/>
             </a:solidFill>
             <a:prstDash val="sysDash"/>
             <a:headEnd type="arrow" w="med" len="med"/>
@@ -4499,13 +4452,15 @@
       <p:cxnSp>
         <p:nvCxnSpPr>
           <p:cNvPr id="35" name="Straight Arrow Connector 34"/>
-          <p:cNvCxnSpPr/>
+          <p:cNvCxnSpPr>
+            <a:cxnSpLocks/>
+          </p:cNvCxnSpPr>
           <p:nvPr/>
         </p:nvCxnSpPr>
         <p:spPr>
           <a:xfrm>
-            <a:off x="1739069" y="2266002"/>
-            <a:ext cx="2058118" cy="0"/>
+            <a:off x="1739069" y="2481319"/>
+            <a:ext cx="1713150" cy="0"/>
           </a:xfrm>
           <a:prstGeom prst="straightConnector1">
             <a:avLst/>
@@ -4542,7 +4497,7 @@
         </p:nvCxnSpPr>
         <p:spPr>
           <a:xfrm>
-            <a:off x="390618" y="2342202"/>
+            <a:off x="434275" y="2481318"/>
             <a:ext cx="1196051" cy="0"/>
           </a:xfrm>
           <a:prstGeom prst="straightConnector1">
@@ -4580,7 +4535,7 @@
         </p:nvSpPr>
         <p:spPr>
           <a:xfrm>
-            <a:off x="7696200" y="591251"/>
+            <a:off x="7696200" y="579075"/>
             <a:ext cx="1371600" cy="346760"/>
           </a:xfrm>
           <a:prstGeom prst="rect">
@@ -4620,20 +4575,12 @@
           <a:p>
             <a:pPr algn="ctr"/>
             <a:r>
-              <a:rPr lang="en-US" sz="1600" dirty="0" smtClean="0">
+              <a:rPr lang="en-US" sz="1600" dirty="0">
                 <a:solidFill>
                   <a:schemeClr val="bg1"/>
                 </a:solidFill>
               </a:rPr>
-              <a:t>:</a:t>
-            </a:r>
-            <a:r>
-              <a:rPr lang="en-US" sz="1600" dirty="0" err="1" smtClean="0">
-                <a:solidFill>
-                  <a:schemeClr val="bg1"/>
-                </a:solidFill>
-              </a:rPr>
-              <a:t>EventsCenter</a:t>
+              <a:t>:Storage</a:t>
             </a:r>
             <a:endParaRPr lang="en-SG" sz="1600" dirty="0">
               <a:solidFill>
@@ -4651,7 +4598,7 @@
         </p:nvCxnSpPr>
         <p:spPr>
           <a:xfrm>
-            <a:off x="8616802" y="944305"/>
+            <a:off x="8388202" y="932129"/>
             <a:ext cx="0" cy="1723059"/>
           </a:xfrm>
           <a:prstGeom prst="line">
@@ -4690,7 +4637,7 @@
         </p:nvSpPr>
         <p:spPr>
           <a:xfrm>
-            <a:off x="8544794" y="1961202"/>
+            <a:off x="8316194" y="2185413"/>
             <a:ext cx="142006" cy="176787"/>
           </a:xfrm>
           <a:prstGeom prst="rect">
@@ -4745,8 +4692,8 @@
         </p:nvCxnSpPr>
         <p:spPr>
           <a:xfrm>
-            <a:off x="5943992" y="1961202"/>
-            <a:ext cx="2568438" cy="0"/>
+            <a:off x="6705992" y="2185413"/>
+            <a:ext cx="1610202" cy="0"/>
           </a:xfrm>
           <a:prstGeom prst="straightConnector1">
             <a:avLst/>
@@ -4781,8 +4728,8 @@
         </p:nvCxnSpPr>
         <p:spPr>
           <a:xfrm>
-            <a:off x="5943992" y="2137989"/>
-            <a:ext cx="2549946" cy="0"/>
+            <a:off x="6705992" y="2362200"/>
+            <a:ext cx="1610202" cy="0"/>
           </a:xfrm>
           <a:prstGeom prst="straightConnector1">
             <a:avLst/>
@@ -4861,7 +4808,7 @@
           <a:p>
             <a:pPr algn="ctr"/>
             <a:r>
-              <a:rPr lang="en-US" sz="1600" dirty="0" smtClean="0">
+              <a:rPr lang="en-US" sz="1600" dirty="0">
                 <a:solidFill>
                   <a:schemeClr val="bg1"/>
                 </a:solidFill>
@@ -4993,7 +4940,7 @@
           <a:lstStyle/>
           <a:p>
             <a:r>
-              <a:rPr lang="en-US" sz="1400" dirty="0" smtClean="0">
+              <a:rPr lang="en-US" sz="1400" dirty="0">
                 <a:solidFill>
                   <a:schemeClr val="accent5">
                     <a:lumMod val="75000"/>
@@ -5003,7 +4950,7 @@
               <a:t>post(</a:t>
             </a:r>
             <a:r>
-              <a:rPr lang="en-US" sz="1400" dirty="0" err="1" smtClean="0">
+              <a:rPr lang="en-US" sz="1400" dirty="0" err="1">
                 <a:solidFill>
                   <a:schemeClr val="accent5">
                     <a:lumMod val="75000"/>
@@ -5013,7 +4960,7 @@
               <a:t>ForumBookChangedEvent</a:t>
             </a:r>
             <a:r>
-              <a:rPr lang="en-US" sz="1400" dirty="0" smtClean="0">
+              <a:rPr lang="en-US" sz="1400" dirty="0">
                 <a:solidFill>
                   <a:schemeClr val="accent5">
                     <a:lumMod val="75000"/>
@@ -5022,13 +4969,6 @@
               </a:rPr>
               <a:t>)</a:t>
             </a:r>
-            <a:endParaRPr lang="en-US" sz="1400" dirty="0">
-              <a:solidFill>
-                <a:schemeClr val="accent5">
-                  <a:lumMod val="75000"/>
-                </a:schemeClr>
-              </a:solidFill>
-            </a:endParaRPr>
           </a:p>
         </p:txBody>
       </p:sp>
@@ -5120,7 +5060,7 @@
           <a:p>
             <a:pPr algn="ctr"/>
             <a:r>
-              <a:rPr lang="en-US" sz="1600" dirty="0" smtClean="0">
+              <a:rPr lang="en-US" sz="1600" dirty="0">
                 <a:solidFill>
                   <a:schemeClr val="bg1"/>
                 </a:solidFill>
@@ -5128,7 +5068,7 @@
               <a:t>:</a:t>
             </a:r>
             <a:r>
-              <a:rPr lang="en-US" sz="1600" dirty="0" err="1" smtClean="0">
+              <a:rPr lang="en-US" sz="1600" dirty="0" err="1">
                 <a:solidFill>
                   <a:schemeClr val="bg1"/>
                 </a:solidFill>
@@ -5375,7 +5315,7 @@
           <a:lstStyle/>
           <a:p>
             <a:r>
-              <a:rPr lang="en-US" sz="1400" dirty="0" err="1" smtClean="0">
+              <a:rPr lang="en-US" sz="1400" dirty="0" err="1">
                 <a:solidFill>
                   <a:schemeClr val="accent6">
                     <a:lumMod val="75000"/>
@@ -5385,7 +5325,7 @@
               <a:t>handleForumBookChangedEvent</a:t>
             </a:r>
             <a:r>
-              <a:rPr lang="en-US" sz="1400" dirty="0" smtClean="0">
+              <a:rPr lang="en-US" sz="1400" dirty="0">
                 <a:solidFill>
                   <a:schemeClr val="accent6">
                     <a:lumMod val="75000"/>
@@ -5394,13 +5334,6 @@
               </a:rPr>
               <a:t>()</a:t>
             </a:r>
-            <a:endParaRPr lang="en-US" sz="1400" dirty="0">
-              <a:solidFill>
-                <a:schemeClr val="accent6">
-                  <a:lumMod val="75000"/>
-                </a:schemeClr>
-              </a:solidFill>
-            </a:endParaRPr>
           </a:p>
         </p:txBody>
       </p:sp>
@@ -5485,7 +5418,7 @@
           <a:p>
             <a:pPr algn="ctr"/>
             <a:r>
-              <a:rPr lang="en-US" sz="1600" dirty="0" smtClean="0">
+              <a:rPr lang="en-US" sz="1600" dirty="0">
                 <a:solidFill>
                   <a:schemeClr val="bg1"/>
                 </a:solidFill>
@@ -5688,7 +5621,7 @@
           <a:lstStyle/>
           <a:p>
             <a:r>
-              <a:rPr lang="en-US" sz="1400" dirty="0" err="1" smtClean="0">
+              <a:rPr lang="en-US" sz="1400" dirty="0" err="1">
                 <a:solidFill>
                   <a:srgbClr val="00B050"/>
                 </a:solidFill>
@@ -5696,18 +5629,13 @@
               <a:t>handleForumBookChangedEvent</a:t>
             </a:r>
             <a:r>
-              <a:rPr lang="en-US" sz="1400" dirty="0" smtClean="0">
+              <a:rPr lang="en-US" sz="1400" dirty="0">
                 <a:solidFill>
                   <a:srgbClr val="00B050"/>
                 </a:solidFill>
               </a:rPr>
               <a:t>()</a:t>
             </a:r>
-            <a:endParaRPr lang="en-US" sz="1400" dirty="0">
-              <a:solidFill>
-                <a:srgbClr val="00B050"/>
-              </a:solidFill>
-            </a:endParaRPr>
           </a:p>
         </p:txBody>
       </p:sp>
@@ -5894,18 +5822,13 @@
           <a:p>
             <a:pPr algn="r"/>
             <a:r>
-              <a:rPr lang="en-US" sz="1400" dirty="0" smtClean="0">
+              <a:rPr lang="en-US" sz="1400" dirty="0">
                 <a:solidFill>
                   <a:srgbClr val="00B050"/>
                 </a:solidFill>
               </a:rPr>
               <a:t>Update status bar</a:t>
             </a:r>
-            <a:endParaRPr lang="en-US" sz="1400" dirty="0">
-              <a:solidFill>
-                <a:srgbClr val="00B050"/>
-              </a:solidFill>
-            </a:endParaRPr>
           </a:p>
         </p:txBody>
       </p:sp>
@@ -6095,7 +6018,7 @@
           <a:lstStyle/>
           <a:p>
             <a:r>
-              <a:rPr lang="en-US" sz="1400" dirty="0" smtClean="0">
+              <a:rPr lang="en-US" sz="1400" dirty="0">
                 <a:solidFill>
                   <a:schemeClr val="accent6">
                     <a:lumMod val="75000"/>
@@ -6105,7 +6028,7 @@
               <a:t>Save </a:t>
             </a:r>
             <a:br>
-              <a:rPr lang="en-US" sz="1400" dirty="0" smtClean="0">
+              <a:rPr lang="en-US" sz="1400" dirty="0">
                 <a:solidFill>
                   <a:schemeClr val="accent6">
                     <a:lumMod val="75000"/>
@@ -6114,7 +6037,7 @@
               </a:rPr>
             </a:br>
             <a:r>
-              <a:rPr lang="en-US" sz="1400" dirty="0" smtClean="0">
+              <a:rPr lang="en-US" sz="1400" dirty="0">
                 <a:solidFill>
                   <a:schemeClr val="accent6">
                     <a:lumMod val="75000"/>
@@ -6123,13 +6046,338 @@
               </a:rPr>
               <a:t>to file</a:t>
             </a:r>
-            <a:endParaRPr lang="en-US" sz="1400" dirty="0">
+          </a:p>
+        </p:txBody>
+      </p:sp>
+      <p:sp>
+        <p:nvSpPr>
+          <p:cNvPr id="15" name="TextBox 14"/>
+          <p:cNvSpPr txBox="1"/>
+          <p:nvPr/>
+        </p:nvSpPr>
+        <p:spPr>
+          <a:xfrm>
+            <a:off x="34834" y="2891246"/>
+            <a:ext cx="184731" cy="369332"/>
+          </a:xfrm>
+          <a:prstGeom prst="rect">
+            <a:avLst/>
+          </a:prstGeom>
+          <a:noFill/>
+        </p:spPr>
+        <p:txBody>
+          <a:bodyPr wrap="none" rtlCol="0">
+            <a:spAutoFit/>
+          </a:bodyPr>
+          <a:lstStyle/>
+          <a:p>
+            <a:endParaRPr lang="en-US" dirty="0"/>
+          </a:p>
+        </p:txBody>
+      </p:sp>
+      <p:sp>
+        <p:nvSpPr>
+          <p:cNvPr id="77" name="Rectangle 62">
+            <a:extLst>
+              <a:ext uri="{FF2B5EF4-FFF2-40B4-BE49-F238E27FC236}">
+                <a16:creationId xmlns:a16="http://schemas.microsoft.com/office/drawing/2014/main" id="{3FE0130E-66BF-6E49-A3BE-B706CE8B0EE5}"/>
+              </a:ext>
+            </a:extLst>
+          </p:cNvPr>
+          <p:cNvSpPr/>
+          <p:nvPr/>
+        </p:nvSpPr>
+        <p:spPr>
+          <a:xfrm>
+            <a:off x="4574465" y="606177"/>
+            <a:ext cx="1093635" cy="346760"/>
+          </a:xfrm>
+          <a:prstGeom prst="rect">
+            <a:avLst/>
+          </a:prstGeom>
+          <a:solidFill>
+            <a:schemeClr val="accent6">
+              <a:lumMod val="75000"/>
+            </a:schemeClr>
+          </a:solidFill>
+          <a:ln w="19050">
+            <a:solidFill>
+              <a:schemeClr val="accent6">
+                <a:lumMod val="75000"/>
+              </a:schemeClr>
+            </a:solidFill>
+          </a:ln>
+          <a:effectLst/>
+        </p:spPr>
+        <p:style>
+          <a:lnRef idx="1">
+            <a:schemeClr val="accent2"/>
+          </a:lnRef>
+          <a:fillRef idx="2">
+            <a:schemeClr val="accent2"/>
+          </a:fillRef>
+          <a:effectRef idx="1">
+            <a:schemeClr val="accent2"/>
+          </a:effectRef>
+          <a:fontRef idx="minor">
+            <a:schemeClr val="dk1"/>
+          </a:fontRef>
+        </p:style>
+        <p:txBody>
+          <a:bodyPr rtlCol="0" anchor="ctr"/>
+          <a:lstStyle/>
+          <a:p>
+            <a:pPr algn="ctr"/>
+            <a:r>
+              <a:rPr lang="en-US" sz="1600" dirty="0">
+                <a:solidFill>
+                  <a:schemeClr val="bg1"/>
+                </a:solidFill>
+              </a:rPr>
+              <a:t>:User</a:t>
+            </a:r>
+            <a:endParaRPr lang="en-SG" sz="1600" dirty="0">
               <a:solidFill>
-                <a:schemeClr val="accent6">
-                  <a:lumMod val="75000"/>
-                </a:schemeClr>
+                <a:schemeClr val="bg1"/>
               </a:solidFill>
             </a:endParaRPr>
+          </a:p>
+        </p:txBody>
+      </p:sp>
+      <p:cxnSp>
+        <p:nvCxnSpPr>
+          <p:cNvPr id="78" name="Straight Connector 77">
+            <a:extLst>
+              <a:ext uri="{FF2B5EF4-FFF2-40B4-BE49-F238E27FC236}">
+                <a16:creationId xmlns:a16="http://schemas.microsoft.com/office/drawing/2014/main" id="{8F0C81FE-9520-1C40-B021-51599F4ADC24}"/>
+              </a:ext>
+            </a:extLst>
+          </p:cNvPr>
+          <p:cNvCxnSpPr>
+            <a:cxnSpLocks/>
+          </p:cNvCxnSpPr>
+          <p:nvPr/>
+        </p:nvCxnSpPr>
+        <p:spPr>
+          <a:xfrm>
+            <a:off x="5121282" y="969848"/>
+            <a:ext cx="0" cy="959883"/>
+          </a:xfrm>
+          <a:prstGeom prst="line">
+            <a:avLst/>
+          </a:prstGeom>
+          <a:ln w="19050">
+            <a:solidFill>
+              <a:schemeClr val="accent6">
+                <a:lumMod val="75000"/>
+              </a:schemeClr>
+            </a:solidFill>
+            <a:prstDash val="sysDash"/>
+          </a:ln>
+          <a:effectLst/>
+        </p:spPr>
+        <p:style>
+          <a:lnRef idx="1">
+            <a:schemeClr val="accent1"/>
+          </a:lnRef>
+          <a:fillRef idx="2">
+            <a:schemeClr val="accent1"/>
+          </a:fillRef>
+          <a:effectRef idx="1">
+            <a:schemeClr val="accent1"/>
+          </a:effectRef>
+          <a:fontRef idx="minor">
+            <a:schemeClr val="dk1"/>
+          </a:fontRef>
+        </p:style>
+      </p:cxnSp>
+      <p:sp>
+        <p:nvSpPr>
+          <p:cNvPr id="83" name="Rectangle 82">
+            <a:extLst>
+              <a:ext uri="{FF2B5EF4-FFF2-40B4-BE49-F238E27FC236}">
+                <a16:creationId xmlns:a16="http://schemas.microsoft.com/office/drawing/2014/main" id="{513C695F-546A-474E-9CC2-20F553144DAE}"/>
+              </a:ext>
+            </a:extLst>
+          </p:cNvPr>
+          <p:cNvSpPr/>
+          <p:nvPr/>
+        </p:nvSpPr>
+        <p:spPr>
+          <a:xfrm>
+            <a:off x="5029200" y="1371600"/>
+            <a:ext cx="187632" cy="381000"/>
+          </a:xfrm>
+          <a:prstGeom prst="rect">
+            <a:avLst/>
+          </a:prstGeom>
+          <a:solidFill>
+            <a:schemeClr val="accent6">
+              <a:lumMod val="75000"/>
+            </a:schemeClr>
+          </a:solidFill>
+          <a:ln>
+            <a:solidFill>
+              <a:schemeClr val="accent6">
+                <a:lumMod val="75000"/>
+              </a:schemeClr>
+            </a:solidFill>
+          </a:ln>
+          <a:effectLst/>
+        </p:spPr>
+        <p:style>
+          <a:lnRef idx="1">
+            <a:schemeClr val="accent3"/>
+          </a:lnRef>
+          <a:fillRef idx="2">
+            <a:schemeClr val="accent3"/>
+          </a:fillRef>
+          <a:effectRef idx="1">
+            <a:schemeClr val="accent3"/>
+          </a:effectRef>
+          <a:fontRef idx="minor">
+            <a:schemeClr val="dk1"/>
+          </a:fontRef>
+        </p:style>
+        <p:txBody>
+          <a:bodyPr rtlCol="0" anchor="ctr"/>
+          <a:lstStyle/>
+          <a:p>
+            <a:pPr algn="ctr"/>
+            <a:endParaRPr lang="en-SG" sz="1400">
+              <a:solidFill>
+                <a:schemeClr val="dk1"/>
+              </a:solidFill>
+            </a:endParaRPr>
+          </a:p>
+        </p:txBody>
+      </p:sp>
+      <p:cxnSp>
+        <p:nvCxnSpPr>
+          <p:cNvPr id="84" name="Straight Arrow Connector 83">
+            <a:extLst>
+              <a:ext uri="{FF2B5EF4-FFF2-40B4-BE49-F238E27FC236}">
+                <a16:creationId xmlns:a16="http://schemas.microsoft.com/office/drawing/2014/main" id="{F61F4022-5AD8-7A4C-8980-F68F7C69162D}"/>
+              </a:ext>
+            </a:extLst>
+          </p:cNvPr>
+          <p:cNvCxnSpPr>
+            <a:cxnSpLocks/>
+          </p:cNvCxnSpPr>
+          <p:nvPr/>
+        </p:nvCxnSpPr>
+        <p:spPr>
+          <a:xfrm>
+            <a:off x="3596235" y="2057400"/>
+            <a:ext cx="2957357" cy="0"/>
+          </a:xfrm>
+          <a:prstGeom prst="straightConnector1">
+            <a:avLst/>
+          </a:prstGeom>
+          <a:ln w="19050">
+            <a:solidFill>
+              <a:srgbClr val="0070C0"/>
+            </a:solidFill>
+            <a:tailEnd type="arrow"/>
+          </a:ln>
+        </p:spPr>
+        <p:style>
+          <a:lnRef idx="1">
+            <a:schemeClr val="accent1"/>
+          </a:lnRef>
+          <a:fillRef idx="0">
+            <a:schemeClr val="accent1"/>
+          </a:fillRef>
+          <a:effectRef idx="0">
+            <a:schemeClr val="accent1"/>
+          </a:effectRef>
+          <a:fontRef idx="minor">
+            <a:schemeClr val="tx1"/>
+          </a:fontRef>
+        </p:style>
+      </p:cxnSp>
+      <p:cxnSp>
+        <p:nvCxnSpPr>
+          <p:cNvPr id="86" name="Straight Arrow Connector 85">
+            <a:extLst>
+              <a:ext uri="{FF2B5EF4-FFF2-40B4-BE49-F238E27FC236}">
+                <a16:creationId xmlns:a16="http://schemas.microsoft.com/office/drawing/2014/main" id="{76F83257-F4F5-8048-90BD-0184D7949E0E}"/>
+              </a:ext>
+            </a:extLst>
+          </p:cNvPr>
+          <p:cNvCxnSpPr>
+            <a:cxnSpLocks/>
+          </p:cNvCxnSpPr>
+          <p:nvPr/>
+        </p:nvCxnSpPr>
+        <p:spPr>
+          <a:xfrm>
+            <a:off x="3616425" y="2481319"/>
+            <a:ext cx="2937167" cy="0"/>
+          </a:xfrm>
+          <a:prstGeom prst="straightConnector1">
+            <a:avLst/>
+          </a:prstGeom>
+          <a:ln w="19050">
+            <a:solidFill>
+              <a:srgbClr val="7030A0"/>
+            </a:solidFill>
+            <a:prstDash val="sysDash"/>
+            <a:headEnd type="arrow" w="med" len="med"/>
+            <a:tailEnd type="none" w="med" len="med"/>
+          </a:ln>
+        </p:spPr>
+        <p:style>
+          <a:lnRef idx="1">
+            <a:schemeClr val="accent1"/>
+          </a:lnRef>
+          <a:fillRef idx="0">
+            <a:schemeClr val="accent1"/>
+          </a:fillRef>
+          <a:effectRef idx="0">
+            <a:schemeClr val="accent1"/>
+          </a:effectRef>
+          <a:fontRef idx="minor">
+            <a:schemeClr val="tx1"/>
+          </a:fontRef>
+        </p:style>
+      </p:cxnSp>
+      <p:sp>
+        <p:nvSpPr>
+          <p:cNvPr id="91" name="TextBox 90">
+            <a:extLst>
+              <a:ext uri="{FF2B5EF4-FFF2-40B4-BE49-F238E27FC236}">
+                <a16:creationId xmlns:a16="http://schemas.microsoft.com/office/drawing/2014/main" id="{166720AE-385E-1F45-8B36-E8D11A29A3FA}"/>
+              </a:ext>
+            </a:extLst>
+          </p:cNvPr>
+          <p:cNvSpPr txBox="1"/>
+          <p:nvPr/>
+        </p:nvSpPr>
+        <p:spPr>
+          <a:xfrm>
+            <a:off x="4755558" y="2045018"/>
+            <a:ext cx="849642" cy="215444"/>
+          </a:xfrm>
+          <a:prstGeom prst="rect">
+            <a:avLst/>
+          </a:prstGeom>
+          <a:noFill/>
+        </p:spPr>
+        <p:txBody>
+          <a:bodyPr wrap="square" lIns="0" tIns="0" rIns="0" bIns="0" rtlCol="0">
+            <a:spAutoFit/>
+          </a:bodyPr>
+          <a:lstStyle/>
+          <a:p>
+            <a:r>
+              <a:rPr lang="en-US" sz="1400" dirty="0">
+                <a:solidFill>
+                  <a:srgbClr val="0070C0"/>
+                </a:solidFill>
+              </a:rPr>
+              <a:t>commit()</a:t>
+            </a:r>
           </a:p>
         </p:txBody>
       </p:sp>
@@ -6143,13 +6391,6 @@
   <p:clrMapOvr>
     <a:masterClrMapping/>
   </p:clrMapOvr>
-  <p:timing>
-    <p:tnLst>
-      <p:par>
-        <p:cTn id="1" dur="indefinite" restart="never" nodeType="tmRoot"/>
-      </p:par>
-    </p:tnLst>
-  </p:timing>
 </p:sld>
 </file>
 

</xml_diff>

<commit_message>
Updated DG and its diagrams
</commit_message>
<xml_diff>
--- a/docs/diagrams/HighLevelSequenceDiagrams.pptx
+++ b/docs/diagrams/HighLevelSequenceDiagrams.pptx
@@ -107,6 +107,22 @@
       </a:defRPr>
     </a:lvl9pPr>
   </p:defaultTextStyle>
+  <p:extLst>
+    <p:ext uri="{EFAFB233-063F-42B5-8137-9DF3F51BA10A}">
+      <p15:sldGuideLst xmlns:p15="http://schemas.microsoft.com/office/powerpoint/2012/main">
+        <p15:guide id="1" orient="horz" pos="1488">
+          <p15:clr>
+            <a:srgbClr val="A4A3A4"/>
+          </p15:clr>
+        </p15:guide>
+        <p15:guide id="2" pos="2880">
+          <p15:clr>
+            <a:srgbClr val="A4A3A4"/>
+          </p15:clr>
+        </p15:guide>
+      </p15:sldGuideLst>
+    </p:ext>
+  </p:extLst>
 </p:presentation>
 </file>
 
@@ -192,7 +208,7 @@
           <a:p>
             <a:fld id="{F5CC4B3F-88C1-4FFA-B1B6-F41C21DC6924}" type="datetimeFigureOut">
               <a:rPr lang="en-US" smtClean="0"/>
-              <a:t>10/16/2016</a:t>
+              <a:t>10/21/2018</a:t>
             </a:fld>
             <a:endParaRPr lang="en-US"/>
           </a:p>
@@ -256,38 +272,37 @@
           <a:p>
             <a:pPr lvl="0"/>
             <a:r>
-              <a:rPr lang="en-US" smtClean="0"/>
+              <a:rPr lang="en-US"/>
               <a:t>Click to edit Master text styles</a:t>
             </a:r>
           </a:p>
           <a:p>
             <a:pPr lvl="1"/>
             <a:r>
-              <a:rPr lang="en-US" smtClean="0"/>
+              <a:rPr lang="en-US"/>
               <a:t>Second level</a:t>
             </a:r>
           </a:p>
           <a:p>
             <a:pPr lvl="2"/>
             <a:r>
-              <a:rPr lang="en-US" smtClean="0"/>
+              <a:rPr lang="en-US"/>
               <a:t>Third level</a:t>
             </a:r>
           </a:p>
           <a:p>
             <a:pPr lvl="3"/>
             <a:r>
-              <a:rPr lang="en-US" smtClean="0"/>
+              <a:rPr lang="en-US"/>
               <a:t>Fourth level</a:t>
             </a:r>
           </a:p>
           <a:p>
             <a:pPr lvl="4"/>
             <a:r>
-              <a:rPr lang="en-US" smtClean="0"/>
+              <a:rPr lang="en-US"/>
               <a:t>Fifth level</a:t>
             </a:r>
-            <a:endParaRPr lang="en-US"/>
           </a:p>
         </p:txBody>
       </p:sp>
@@ -498,10 +513,9 @@
           <a:lstStyle/>
           <a:p>
             <a:r>
-              <a:rPr lang="en-US" smtClean="0"/>
+              <a:rPr lang="en-US"/>
               <a:t>Click to edit Master title style</a:t>
             </a:r>
-            <a:endParaRPr lang="en-US"/>
           </a:p>
         </p:txBody>
       </p:sp>
@@ -617,10 +631,9 @@
           </a:lstStyle>
           <a:p>
             <a:r>
-              <a:rPr lang="en-US" smtClean="0"/>
+              <a:rPr lang="en-US"/>
               <a:t>Click to edit Master subtitle style</a:t>
             </a:r>
-            <a:endParaRPr lang="en-US"/>
           </a:p>
         </p:txBody>
       </p:sp>
@@ -641,7 +654,7 @@
           <a:p>
             <a:fld id="{78C97017-6FC3-485B-9764-EAC9E56C1D49}" type="datetimeFigureOut">
               <a:rPr lang="en-US" smtClean="0"/>
-              <a:t>10/16/2016</a:t>
+              <a:t>10/21/2018</a:t>
             </a:fld>
             <a:endParaRPr lang="en-US"/>
           </a:p>
@@ -735,10 +748,9 @@
           <a:lstStyle/>
           <a:p>
             <a:r>
-              <a:rPr lang="en-US" smtClean="0"/>
+              <a:rPr lang="en-US"/>
               <a:t>Click to edit Master title style</a:t>
             </a:r>
-            <a:endParaRPr lang="en-US"/>
           </a:p>
         </p:txBody>
       </p:sp>
@@ -759,38 +771,37 @@
           <a:p>
             <a:pPr lvl="0"/>
             <a:r>
-              <a:rPr lang="en-US" smtClean="0"/>
+              <a:rPr lang="en-US"/>
               <a:t>Click to edit Master text styles</a:t>
             </a:r>
           </a:p>
           <a:p>
             <a:pPr lvl="1"/>
             <a:r>
-              <a:rPr lang="en-US" smtClean="0"/>
+              <a:rPr lang="en-US"/>
               <a:t>Second level</a:t>
             </a:r>
           </a:p>
           <a:p>
             <a:pPr lvl="2"/>
             <a:r>
-              <a:rPr lang="en-US" smtClean="0"/>
+              <a:rPr lang="en-US"/>
               <a:t>Third level</a:t>
             </a:r>
           </a:p>
           <a:p>
             <a:pPr lvl="3"/>
             <a:r>
-              <a:rPr lang="en-US" smtClean="0"/>
+              <a:rPr lang="en-US"/>
               <a:t>Fourth level</a:t>
             </a:r>
           </a:p>
           <a:p>
             <a:pPr lvl="4"/>
             <a:r>
-              <a:rPr lang="en-US" smtClean="0"/>
+              <a:rPr lang="en-US"/>
               <a:t>Fifth level</a:t>
             </a:r>
-            <a:endParaRPr lang="en-US"/>
           </a:p>
         </p:txBody>
       </p:sp>
@@ -811,7 +822,7 @@
           <a:p>
             <a:fld id="{78C97017-6FC3-485B-9764-EAC9E56C1D49}" type="datetimeFigureOut">
               <a:rPr lang="en-US" smtClean="0"/>
-              <a:t>10/16/2016</a:t>
+              <a:t>10/21/2018</a:t>
             </a:fld>
             <a:endParaRPr lang="en-US"/>
           </a:p>
@@ -910,10 +921,9 @@
           <a:lstStyle/>
           <a:p>
             <a:r>
-              <a:rPr lang="en-US" smtClean="0"/>
+              <a:rPr lang="en-US"/>
               <a:t>Click to edit Master title style</a:t>
             </a:r>
-            <a:endParaRPr lang="en-US"/>
           </a:p>
         </p:txBody>
       </p:sp>
@@ -939,38 +949,37 @@
           <a:p>
             <a:pPr lvl="0"/>
             <a:r>
-              <a:rPr lang="en-US" smtClean="0"/>
+              <a:rPr lang="en-US"/>
               <a:t>Click to edit Master text styles</a:t>
             </a:r>
           </a:p>
           <a:p>
             <a:pPr lvl="1"/>
             <a:r>
-              <a:rPr lang="en-US" smtClean="0"/>
+              <a:rPr lang="en-US"/>
               <a:t>Second level</a:t>
             </a:r>
           </a:p>
           <a:p>
             <a:pPr lvl="2"/>
             <a:r>
-              <a:rPr lang="en-US" smtClean="0"/>
+              <a:rPr lang="en-US"/>
               <a:t>Third level</a:t>
             </a:r>
           </a:p>
           <a:p>
             <a:pPr lvl="3"/>
             <a:r>
-              <a:rPr lang="en-US" smtClean="0"/>
+              <a:rPr lang="en-US"/>
               <a:t>Fourth level</a:t>
             </a:r>
           </a:p>
           <a:p>
             <a:pPr lvl="4"/>
             <a:r>
-              <a:rPr lang="en-US" smtClean="0"/>
+              <a:rPr lang="en-US"/>
               <a:t>Fifth level</a:t>
             </a:r>
-            <a:endParaRPr lang="en-US"/>
           </a:p>
         </p:txBody>
       </p:sp>
@@ -991,7 +1000,7 @@
           <a:p>
             <a:fld id="{78C97017-6FC3-485B-9764-EAC9E56C1D49}" type="datetimeFigureOut">
               <a:rPr lang="en-US" smtClean="0"/>
-              <a:t>10/16/2016</a:t>
+              <a:t>10/21/2018</a:t>
             </a:fld>
             <a:endParaRPr lang="en-US"/>
           </a:p>
@@ -1085,10 +1094,9 @@
           <a:lstStyle/>
           <a:p>
             <a:r>
-              <a:rPr lang="en-US" smtClean="0"/>
+              <a:rPr lang="en-US"/>
               <a:t>Click to edit Master title style</a:t>
             </a:r>
-            <a:endParaRPr lang="en-US"/>
           </a:p>
         </p:txBody>
       </p:sp>
@@ -1109,38 +1117,37 @@
           <a:p>
             <a:pPr lvl="0"/>
             <a:r>
-              <a:rPr lang="en-US" smtClean="0"/>
+              <a:rPr lang="en-US"/>
               <a:t>Click to edit Master text styles</a:t>
             </a:r>
           </a:p>
           <a:p>
             <a:pPr lvl="1"/>
             <a:r>
-              <a:rPr lang="en-US" smtClean="0"/>
+              <a:rPr lang="en-US"/>
               <a:t>Second level</a:t>
             </a:r>
           </a:p>
           <a:p>
             <a:pPr lvl="2"/>
             <a:r>
-              <a:rPr lang="en-US" smtClean="0"/>
+              <a:rPr lang="en-US"/>
               <a:t>Third level</a:t>
             </a:r>
           </a:p>
           <a:p>
             <a:pPr lvl="3"/>
             <a:r>
-              <a:rPr lang="en-US" smtClean="0"/>
+              <a:rPr lang="en-US"/>
               <a:t>Fourth level</a:t>
             </a:r>
           </a:p>
           <a:p>
             <a:pPr lvl="4"/>
             <a:r>
-              <a:rPr lang="en-US" smtClean="0"/>
+              <a:rPr lang="en-US"/>
               <a:t>Fifth level</a:t>
             </a:r>
-            <a:endParaRPr lang="en-US"/>
           </a:p>
         </p:txBody>
       </p:sp>
@@ -1161,7 +1168,7 @@
           <a:p>
             <a:fld id="{78C97017-6FC3-485B-9764-EAC9E56C1D49}" type="datetimeFigureOut">
               <a:rPr lang="en-US" smtClean="0"/>
-              <a:t>10/16/2016</a:t>
+              <a:t>10/21/2018</a:t>
             </a:fld>
             <a:endParaRPr lang="en-US"/>
           </a:p>
@@ -1264,10 +1271,9 @@
           </a:lstStyle>
           <a:p>
             <a:r>
-              <a:rPr lang="en-US" smtClean="0"/>
+              <a:rPr lang="en-US"/>
               <a:t>Click to edit Master title style</a:t>
             </a:r>
-            <a:endParaRPr lang="en-US"/>
           </a:p>
         </p:txBody>
       </p:sp>
@@ -1384,7 +1390,7 @@
           <a:p>
             <a:pPr lvl="0"/>
             <a:r>
-              <a:rPr lang="en-US" smtClean="0"/>
+              <a:rPr lang="en-US"/>
               <a:t>Click to edit Master text styles</a:t>
             </a:r>
           </a:p>
@@ -1407,7 +1413,7 @@
           <a:p>
             <a:fld id="{78C97017-6FC3-485B-9764-EAC9E56C1D49}" type="datetimeFigureOut">
               <a:rPr lang="en-US" smtClean="0"/>
-              <a:t>10/16/2016</a:t>
+              <a:t>10/21/2018</a:t>
             </a:fld>
             <a:endParaRPr lang="en-US"/>
           </a:p>
@@ -1501,10 +1507,9 @@
           <a:lstStyle/>
           <a:p>
             <a:r>
-              <a:rPr lang="en-US" smtClean="0"/>
+              <a:rPr lang="en-US"/>
               <a:t>Click to edit Master title style</a:t>
             </a:r>
-            <a:endParaRPr lang="en-US"/>
           </a:p>
         </p:txBody>
       </p:sp>
@@ -1558,38 +1563,37 @@
           <a:p>
             <a:pPr lvl="0"/>
             <a:r>
-              <a:rPr lang="en-US" smtClean="0"/>
+              <a:rPr lang="en-US"/>
               <a:t>Click to edit Master text styles</a:t>
             </a:r>
           </a:p>
           <a:p>
             <a:pPr lvl="1"/>
             <a:r>
-              <a:rPr lang="en-US" smtClean="0"/>
+              <a:rPr lang="en-US"/>
               <a:t>Second level</a:t>
             </a:r>
           </a:p>
           <a:p>
             <a:pPr lvl="2"/>
             <a:r>
-              <a:rPr lang="en-US" smtClean="0"/>
+              <a:rPr lang="en-US"/>
               <a:t>Third level</a:t>
             </a:r>
           </a:p>
           <a:p>
             <a:pPr lvl="3"/>
             <a:r>
-              <a:rPr lang="en-US" smtClean="0"/>
+              <a:rPr lang="en-US"/>
               <a:t>Fourth level</a:t>
             </a:r>
           </a:p>
           <a:p>
             <a:pPr lvl="4"/>
             <a:r>
-              <a:rPr lang="en-US" smtClean="0"/>
+              <a:rPr lang="en-US"/>
               <a:t>Fifth level</a:t>
             </a:r>
-            <a:endParaRPr lang="en-US"/>
           </a:p>
         </p:txBody>
       </p:sp>
@@ -1643,38 +1647,37 @@
           <a:p>
             <a:pPr lvl="0"/>
             <a:r>
-              <a:rPr lang="en-US" smtClean="0"/>
+              <a:rPr lang="en-US"/>
               <a:t>Click to edit Master text styles</a:t>
             </a:r>
           </a:p>
           <a:p>
             <a:pPr lvl="1"/>
             <a:r>
-              <a:rPr lang="en-US" smtClean="0"/>
+              <a:rPr lang="en-US"/>
               <a:t>Second level</a:t>
             </a:r>
           </a:p>
           <a:p>
             <a:pPr lvl="2"/>
             <a:r>
-              <a:rPr lang="en-US" smtClean="0"/>
+              <a:rPr lang="en-US"/>
               <a:t>Third level</a:t>
             </a:r>
           </a:p>
           <a:p>
             <a:pPr lvl="3"/>
             <a:r>
-              <a:rPr lang="en-US" smtClean="0"/>
+              <a:rPr lang="en-US"/>
               <a:t>Fourth level</a:t>
             </a:r>
           </a:p>
           <a:p>
             <a:pPr lvl="4"/>
             <a:r>
-              <a:rPr lang="en-US" smtClean="0"/>
+              <a:rPr lang="en-US"/>
               <a:t>Fifth level</a:t>
             </a:r>
-            <a:endParaRPr lang="en-US"/>
           </a:p>
         </p:txBody>
       </p:sp>
@@ -1695,7 +1698,7 @@
           <a:p>
             <a:fld id="{78C97017-6FC3-485B-9764-EAC9E56C1D49}" type="datetimeFigureOut">
               <a:rPr lang="en-US" smtClean="0"/>
-              <a:t>10/16/2016</a:t>
+              <a:t>10/21/2018</a:t>
             </a:fld>
             <a:endParaRPr lang="en-US"/>
           </a:p>
@@ -1793,10 +1796,9 @@
           </a:lstStyle>
           <a:p>
             <a:r>
-              <a:rPr lang="en-US" smtClean="0"/>
+              <a:rPr lang="en-US"/>
               <a:t>Click to edit Master title style</a:t>
             </a:r>
-            <a:endParaRPr lang="en-US"/>
           </a:p>
         </p:txBody>
       </p:sp>
@@ -1859,7 +1861,7 @@
           <a:p>
             <a:pPr lvl="0"/>
             <a:r>
-              <a:rPr lang="en-US" smtClean="0"/>
+              <a:rPr lang="en-US"/>
               <a:t>Click to edit Master text styles</a:t>
             </a:r>
           </a:p>
@@ -1915,38 +1917,37 @@
           <a:p>
             <a:pPr lvl="0"/>
             <a:r>
-              <a:rPr lang="en-US" smtClean="0"/>
+              <a:rPr lang="en-US"/>
               <a:t>Click to edit Master text styles</a:t>
             </a:r>
           </a:p>
           <a:p>
             <a:pPr lvl="1"/>
             <a:r>
-              <a:rPr lang="en-US" smtClean="0"/>
+              <a:rPr lang="en-US"/>
               <a:t>Second level</a:t>
             </a:r>
           </a:p>
           <a:p>
             <a:pPr lvl="2"/>
             <a:r>
-              <a:rPr lang="en-US" smtClean="0"/>
+              <a:rPr lang="en-US"/>
               <a:t>Third level</a:t>
             </a:r>
           </a:p>
           <a:p>
             <a:pPr lvl="3"/>
             <a:r>
-              <a:rPr lang="en-US" smtClean="0"/>
+              <a:rPr lang="en-US"/>
               <a:t>Fourth level</a:t>
             </a:r>
           </a:p>
           <a:p>
             <a:pPr lvl="4"/>
             <a:r>
-              <a:rPr lang="en-US" smtClean="0"/>
+              <a:rPr lang="en-US"/>
               <a:t>Fifth level</a:t>
             </a:r>
-            <a:endParaRPr lang="en-US"/>
           </a:p>
         </p:txBody>
       </p:sp>
@@ -2009,7 +2010,7 @@
           <a:p>
             <a:pPr lvl="0"/>
             <a:r>
-              <a:rPr lang="en-US" smtClean="0"/>
+              <a:rPr lang="en-US"/>
               <a:t>Click to edit Master text styles</a:t>
             </a:r>
           </a:p>
@@ -2065,38 +2066,37 @@
           <a:p>
             <a:pPr lvl="0"/>
             <a:r>
-              <a:rPr lang="en-US" smtClean="0"/>
+              <a:rPr lang="en-US"/>
               <a:t>Click to edit Master text styles</a:t>
             </a:r>
           </a:p>
           <a:p>
             <a:pPr lvl="1"/>
             <a:r>
-              <a:rPr lang="en-US" smtClean="0"/>
+              <a:rPr lang="en-US"/>
               <a:t>Second level</a:t>
             </a:r>
           </a:p>
           <a:p>
             <a:pPr lvl="2"/>
             <a:r>
-              <a:rPr lang="en-US" smtClean="0"/>
+              <a:rPr lang="en-US"/>
               <a:t>Third level</a:t>
             </a:r>
           </a:p>
           <a:p>
             <a:pPr lvl="3"/>
             <a:r>
-              <a:rPr lang="en-US" smtClean="0"/>
+              <a:rPr lang="en-US"/>
               <a:t>Fourth level</a:t>
             </a:r>
           </a:p>
           <a:p>
             <a:pPr lvl="4"/>
             <a:r>
-              <a:rPr lang="en-US" smtClean="0"/>
+              <a:rPr lang="en-US"/>
               <a:t>Fifth level</a:t>
             </a:r>
-            <a:endParaRPr lang="en-US"/>
           </a:p>
         </p:txBody>
       </p:sp>
@@ -2117,7 +2117,7 @@
           <a:p>
             <a:fld id="{78C97017-6FC3-485B-9764-EAC9E56C1D49}" type="datetimeFigureOut">
               <a:rPr lang="en-US" smtClean="0"/>
-              <a:t>10/16/2016</a:t>
+              <a:t>10/21/2018</a:t>
             </a:fld>
             <a:endParaRPr lang="en-US"/>
           </a:p>
@@ -2211,10 +2211,9 @@
           <a:lstStyle/>
           <a:p>
             <a:r>
-              <a:rPr lang="en-US" smtClean="0"/>
+              <a:rPr lang="en-US"/>
               <a:t>Click to edit Master title style</a:t>
             </a:r>
-            <a:endParaRPr lang="en-US"/>
           </a:p>
         </p:txBody>
       </p:sp>
@@ -2235,7 +2234,7 @@
           <a:p>
             <a:fld id="{78C97017-6FC3-485B-9764-EAC9E56C1D49}" type="datetimeFigureOut">
               <a:rPr lang="en-US" smtClean="0"/>
-              <a:t>10/16/2016</a:t>
+              <a:t>10/21/2018</a:t>
             </a:fld>
             <a:endParaRPr lang="en-US"/>
           </a:p>
@@ -2330,7 +2329,7 @@
           <a:p>
             <a:fld id="{78C97017-6FC3-485B-9764-EAC9E56C1D49}" type="datetimeFigureOut">
               <a:rPr lang="en-US" smtClean="0"/>
-              <a:t>10/16/2016</a:t>
+              <a:t>10/21/2018</a:t>
             </a:fld>
             <a:endParaRPr lang="en-US"/>
           </a:p>
@@ -2433,10 +2432,9 @@
           </a:lstStyle>
           <a:p>
             <a:r>
-              <a:rPr lang="en-US" smtClean="0"/>
+              <a:rPr lang="en-US"/>
               <a:t>Click to edit Master title style</a:t>
             </a:r>
-            <a:endParaRPr lang="en-US"/>
           </a:p>
         </p:txBody>
       </p:sp>
@@ -2490,38 +2488,37 @@
           <a:p>
             <a:pPr lvl="0"/>
             <a:r>
-              <a:rPr lang="en-US" smtClean="0"/>
+              <a:rPr lang="en-US"/>
               <a:t>Click to edit Master text styles</a:t>
             </a:r>
           </a:p>
           <a:p>
             <a:pPr lvl="1"/>
             <a:r>
-              <a:rPr lang="en-US" smtClean="0"/>
+              <a:rPr lang="en-US"/>
               <a:t>Second level</a:t>
             </a:r>
           </a:p>
           <a:p>
             <a:pPr lvl="2"/>
             <a:r>
-              <a:rPr lang="en-US" smtClean="0"/>
+              <a:rPr lang="en-US"/>
               <a:t>Third level</a:t>
             </a:r>
           </a:p>
           <a:p>
             <a:pPr lvl="3"/>
             <a:r>
-              <a:rPr lang="en-US" smtClean="0"/>
+              <a:rPr lang="en-US"/>
               <a:t>Fourth level</a:t>
             </a:r>
           </a:p>
           <a:p>
             <a:pPr lvl="4"/>
             <a:r>
-              <a:rPr lang="en-US" smtClean="0"/>
+              <a:rPr lang="en-US"/>
               <a:t>Fifth level</a:t>
             </a:r>
-            <a:endParaRPr lang="en-US"/>
           </a:p>
         </p:txBody>
       </p:sp>
@@ -2584,7 +2581,7 @@
           <a:p>
             <a:pPr lvl="0"/>
             <a:r>
-              <a:rPr lang="en-US" smtClean="0"/>
+              <a:rPr lang="en-US"/>
               <a:t>Click to edit Master text styles</a:t>
             </a:r>
           </a:p>
@@ -2607,7 +2604,7 @@
           <a:p>
             <a:fld id="{78C97017-6FC3-485B-9764-EAC9E56C1D49}" type="datetimeFigureOut">
               <a:rPr lang="en-US" smtClean="0"/>
-              <a:t>10/16/2016</a:t>
+              <a:t>10/21/2018</a:t>
             </a:fld>
             <a:endParaRPr lang="en-US"/>
           </a:p>
@@ -2710,10 +2707,9 @@
           </a:lstStyle>
           <a:p>
             <a:r>
-              <a:rPr lang="en-US" smtClean="0"/>
+              <a:rPr lang="en-US"/>
               <a:t>Click to edit Master title style</a:t>
             </a:r>
-            <a:endParaRPr lang="en-US"/>
           </a:p>
         </p:txBody>
       </p:sp>
@@ -2837,7 +2833,7 @@
           <a:p>
             <a:pPr lvl="0"/>
             <a:r>
-              <a:rPr lang="en-US" smtClean="0"/>
+              <a:rPr lang="en-US"/>
               <a:t>Click to edit Master text styles</a:t>
             </a:r>
           </a:p>
@@ -2860,7 +2856,7 @@
           <a:p>
             <a:fld id="{78C97017-6FC3-485B-9764-EAC9E56C1D49}" type="datetimeFigureOut">
               <a:rPr lang="en-US" smtClean="0"/>
-              <a:t>10/16/2016</a:t>
+              <a:t>10/21/2018</a:t>
             </a:fld>
             <a:endParaRPr lang="en-US"/>
           </a:p>
@@ -2969,10 +2965,9 @@
           <a:lstStyle/>
           <a:p>
             <a:r>
-              <a:rPr lang="en-US" smtClean="0"/>
+              <a:rPr lang="en-US"/>
               <a:t>Click to edit Master title style</a:t>
             </a:r>
-            <a:endParaRPr lang="en-US"/>
           </a:p>
         </p:txBody>
       </p:sp>
@@ -3003,38 +2998,37 @@
           <a:p>
             <a:pPr lvl="0"/>
             <a:r>
-              <a:rPr lang="en-US" smtClean="0"/>
+              <a:rPr lang="en-US"/>
               <a:t>Click to edit Master text styles</a:t>
             </a:r>
           </a:p>
           <a:p>
             <a:pPr lvl="1"/>
             <a:r>
-              <a:rPr lang="en-US" smtClean="0"/>
+              <a:rPr lang="en-US"/>
               <a:t>Second level</a:t>
             </a:r>
           </a:p>
           <a:p>
             <a:pPr lvl="2"/>
             <a:r>
-              <a:rPr lang="en-US" smtClean="0"/>
+              <a:rPr lang="en-US"/>
               <a:t>Third level</a:t>
             </a:r>
           </a:p>
           <a:p>
             <a:pPr lvl="3"/>
             <a:r>
-              <a:rPr lang="en-US" smtClean="0"/>
+              <a:rPr lang="en-US"/>
               <a:t>Fourth level</a:t>
             </a:r>
           </a:p>
           <a:p>
             <a:pPr lvl="4"/>
             <a:r>
-              <a:rPr lang="en-US" smtClean="0"/>
+              <a:rPr lang="en-US"/>
               <a:t>Fifth level</a:t>
             </a:r>
-            <a:endParaRPr lang="en-US"/>
           </a:p>
         </p:txBody>
       </p:sp>
@@ -3073,7 +3067,7 @@
           <a:p>
             <a:fld id="{78C97017-6FC3-485B-9764-EAC9E56C1D49}" type="datetimeFigureOut">
               <a:rPr lang="en-US" smtClean="0"/>
-              <a:t>10/16/2016</a:t>
+              <a:t>10/21/2018</a:t>
             </a:fld>
             <a:endParaRPr lang="en-US"/>
           </a:p>
@@ -3492,7 +3486,7 @@
           <a:p>
             <a:pPr algn="ctr"/>
             <a:r>
-              <a:rPr lang="en-US" sz="1600" dirty="0" smtClean="0">
+              <a:rPr lang="en-US" sz="1600" dirty="0">
                 <a:solidFill>
                   <a:schemeClr val="bg1"/>
                 </a:solidFill>
@@ -3856,7 +3850,7 @@
           <a:p>
             <a:pPr algn="ctr"/>
             <a:r>
-              <a:rPr lang="en-US" sz="1600" dirty="0" smtClean="0">
+              <a:rPr lang="en-US" sz="1600" dirty="0">
                 <a:solidFill>
                   <a:schemeClr val="bg1"/>
                 </a:solidFill>
@@ -4003,7 +3997,7 @@
           <a:p>
             <a:pPr algn="ctr"/>
             <a:r>
-              <a:rPr lang="en-US" sz="1600" dirty="0" smtClean="0">
+              <a:rPr lang="en-US" sz="1600" dirty="0">
                 <a:solidFill>
                   <a:schemeClr val="bg1"/>
                 </a:solidFill>
@@ -4165,10 +4159,9 @@
           <a:lstStyle/>
           <a:p>
             <a:r>
-              <a:rPr lang="en-US" sz="1400" dirty="0" smtClean="0"/>
+              <a:rPr lang="en-US" sz="1400" dirty="0"/>
               <a:t>delete 1</a:t>
             </a:r>
-            <a:endParaRPr lang="en-US" sz="1400" dirty="0"/>
           </a:p>
         </p:txBody>
       </p:sp>
@@ -4231,18 +4224,13 @@
           <a:lstStyle/>
           <a:p>
             <a:r>
-              <a:rPr lang="en-US" sz="1400" dirty="0" smtClean="0">
+              <a:rPr lang="en-US" sz="1400" dirty="0">
                 <a:solidFill>
                   <a:srgbClr val="0070C0"/>
                 </a:solidFill>
               </a:rPr>
               <a:t>execute(“delete 1”)</a:t>
             </a:r>
-            <a:endParaRPr lang="en-US" sz="1400" dirty="0">
-              <a:solidFill>
-                <a:srgbClr val="0070C0"/>
-              </a:solidFill>
-            </a:endParaRPr>
           </a:p>
         </p:txBody>
       </p:sp>
@@ -4305,26 +4293,21 @@
           <a:lstStyle/>
           <a:p>
             <a:r>
-              <a:rPr lang="en-US" sz="1400" dirty="0" err="1" smtClean="0">
+              <a:rPr lang="en-US" sz="1400" dirty="0" err="1">
                 <a:solidFill>
                   <a:srgbClr val="7030A0"/>
                 </a:solidFill>
               </a:rPr>
-              <a:t>deletePerson</a:t>
-            </a:r>
-            <a:r>
-              <a:rPr lang="en-US" sz="1400" dirty="0" smtClean="0">
+              <a:t>deleteTask</a:t>
+            </a:r>
+            <a:r>
+              <a:rPr lang="en-US" sz="1400" dirty="0">
                 <a:solidFill>
                   <a:srgbClr val="7030A0"/>
                 </a:solidFill>
               </a:rPr>
-              <a:t>(p)</a:t>
-            </a:r>
-            <a:endParaRPr lang="en-US" sz="1400" dirty="0">
-              <a:solidFill>
-                <a:srgbClr val="7030A0"/>
-              </a:solidFill>
-            </a:endParaRPr>
+              <a:t>(t)</a:t>
+            </a:r>
           </a:p>
         </p:txBody>
       </p:sp>
@@ -4351,7 +4334,7 @@
           <a:lstStyle/>
           <a:p>
             <a:r>
-              <a:rPr lang="en-US" sz="1400" dirty="0" smtClean="0">
+              <a:rPr lang="en-US" sz="1400" dirty="0">
                 <a:solidFill>
                   <a:schemeClr val="accent5">
                     <a:lumMod val="75000"/>
@@ -4361,17 +4344,17 @@
               <a:t>post(</a:t>
             </a:r>
             <a:r>
-              <a:rPr lang="en-US" sz="1400" dirty="0" err="1" smtClean="0">
+              <a:rPr lang="en-US" sz="1400" dirty="0" err="1">
                 <a:solidFill>
                   <a:schemeClr val="accent5">
                     <a:lumMod val="75000"/>
                   </a:schemeClr>
                 </a:solidFill>
               </a:rPr>
-              <a:t>AddressBookChangedEvent</a:t>
-            </a:r>
-            <a:r>
-              <a:rPr lang="en-US" sz="1400" dirty="0" smtClean="0">
+              <a:t>TaskBookChangedEvent</a:t>
+            </a:r>
+            <a:r>
+              <a:rPr lang="en-US" sz="1400" dirty="0">
                 <a:solidFill>
                   <a:schemeClr val="accent5">
                     <a:lumMod val="75000"/>
@@ -4380,13 +4363,6 @@
               </a:rPr>
               <a:t>)</a:t>
             </a:r>
-            <a:endParaRPr lang="en-US" sz="1400" dirty="0">
-              <a:solidFill>
-                <a:schemeClr val="accent5">
-                  <a:lumMod val="75000"/>
-                </a:schemeClr>
-              </a:solidFill>
-            </a:endParaRPr>
           </a:p>
         </p:txBody>
       </p:sp>
@@ -4552,7 +4528,7 @@
           <a:p>
             <a:pPr algn="ctr"/>
             <a:r>
-              <a:rPr lang="en-US" sz="1600" dirty="0" smtClean="0">
+              <a:rPr lang="en-US" sz="1600" dirty="0">
                 <a:solidFill>
                   <a:schemeClr val="bg1"/>
                 </a:solidFill>
@@ -4560,7 +4536,7 @@
               <a:t>:</a:t>
             </a:r>
             <a:r>
-              <a:rPr lang="en-US" sz="1600" dirty="0" err="1" smtClean="0">
+              <a:rPr lang="en-US" sz="1600" dirty="0" err="1">
                 <a:solidFill>
                   <a:schemeClr val="bg1"/>
                 </a:solidFill>
@@ -4793,7 +4769,7 @@
           <a:p>
             <a:pPr algn="ctr"/>
             <a:r>
-              <a:rPr lang="en-US" sz="1600" dirty="0" smtClean="0">
+              <a:rPr lang="en-US" sz="1600" dirty="0">
                 <a:solidFill>
                   <a:schemeClr val="bg1"/>
                 </a:solidFill>
@@ -4925,7 +4901,7 @@
           <a:lstStyle/>
           <a:p>
             <a:r>
-              <a:rPr lang="en-US" sz="1400" dirty="0" smtClean="0">
+              <a:rPr lang="en-US" sz="1400" dirty="0">
                 <a:solidFill>
                   <a:schemeClr val="accent5">
                     <a:lumMod val="75000"/>
@@ -4935,17 +4911,17 @@
               <a:t>post(</a:t>
             </a:r>
             <a:r>
-              <a:rPr lang="en-US" sz="1400" dirty="0" err="1" smtClean="0">
+              <a:rPr lang="en-US" sz="1400" dirty="0" err="1">
                 <a:solidFill>
                   <a:schemeClr val="accent5">
                     <a:lumMod val="75000"/>
                   </a:schemeClr>
                 </a:solidFill>
               </a:rPr>
-              <a:t>AddressBookChangedEvent</a:t>
-            </a:r>
-            <a:r>
-              <a:rPr lang="en-US" sz="1400" dirty="0" smtClean="0">
+              <a:t>TaskBookChangedEvent</a:t>
+            </a:r>
+            <a:r>
+              <a:rPr lang="en-US" sz="1400" dirty="0">
                 <a:solidFill>
                   <a:schemeClr val="accent5">
                     <a:lumMod val="75000"/>
@@ -4954,13 +4930,6 @@
               </a:rPr>
               <a:t>)</a:t>
             </a:r>
-            <a:endParaRPr lang="en-US" sz="1400" dirty="0">
-              <a:solidFill>
-                <a:schemeClr val="accent5">
-                  <a:lumMod val="75000"/>
-                </a:schemeClr>
-              </a:solidFill>
-            </a:endParaRPr>
           </a:p>
         </p:txBody>
       </p:sp>
@@ -5052,7 +5021,7 @@
           <a:p>
             <a:pPr algn="ctr"/>
             <a:r>
-              <a:rPr lang="en-US" sz="1600" dirty="0" smtClean="0">
+              <a:rPr lang="en-US" sz="1600" dirty="0">
                 <a:solidFill>
                   <a:schemeClr val="bg1"/>
                 </a:solidFill>
@@ -5060,7 +5029,7 @@
               <a:t>:</a:t>
             </a:r>
             <a:r>
-              <a:rPr lang="en-US" sz="1600" dirty="0" err="1" smtClean="0">
+              <a:rPr lang="en-US" sz="1600" dirty="0" err="1">
                 <a:solidFill>
                   <a:schemeClr val="bg1"/>
                 </a:solidFill>
@@ -5307,17 +5276,17 @@
           <a:lstStyle/>
           <a:p>
             <a:r>
-              <a:rPr lang="en-US" sz="1400" dirty="0" err="1" smtClean="0">
+              <a:rPr lang="en-US" sz="1400">
                 <a:solidFill>
                   <a:schemeClr val="accent6">
                     <a:lumMod val="75000"/>
                   </a:schemeClr>
                 </a:solidFill>
               </a:rPr>
-              <a:t>handleAddresssBookChangedEvent</a:t>
-            </a:r>
-            <a:r>
-              <a:rPr lang="en-US" sz="1400" dirty="0" smtClean="0">
+              <a:t>handleTaskBookChangedEvent</a:t>
+            </a:r>
+            <a:r>
+              <a:rPr lang="en-US" sz="1400" dirty="0">
                 <a:solidFill>
                   <a:schemeClr val="accent6">
                     <a:lumMod val="75000"/>
@@ -5326,13 +5295,6 @@
               </a:rPr>
               <a:t>()</a:t>
             </a:r>
-            <a:endParaRPr lang="en-US" sz="1400" dirty="0">
-              <a:solidFill>
-                <a:schemeClr val="accent6">
-                  <a:lumMod val="75000"/>
-                </a:schemeClr>
-              </a:solidFill>
-            </a:endParaRPr>
           </a:p>
         </p:txBody>
       </p:sp>
@@ -5417,7 +5379,7 @@
           <a:p>
             <a:pPr algn="ctr"/>
             <a:r>
-              <a:rPr lang="en-US" sz="1600" dirty="0" smtClean="0">
+              <a:rPr lang="en-US" sz="1600" dirty="0">
                 <a:solidFill>
                   <a:schemeClr val="bg1"/>
                 </a:solidFill>
@@ -5620,26 +5582,21 @@
           <a:lstStyle/>
           <a:p>
             <a:r>
-              <a:rPr lang="en-US" sz="1400" dirty="0" err="1" smtClean="0">
+              <a:rPr lang="en-US" sz="1400" dirty="0" err="1">
                 <a:solidFill>
                   <a:srgbClr val="00B050"/>
                 </a:solidFill>
               </a:rPr>
-              <a:t>handleAddresssBookChangedEvent</a:t>
-            </a:r>
-            <a:r>
-              <a:rPr lang="en-US" sz="1400" dirty="0" smtClean="0">
+              <a:t>handleTaskBookChangedEvent</a:t>
+            </a:r>
+            <a:r>
+              <a:rPr lang="en-US" sz="1400" dirty="0">
                 <a:solidFill>
                   <a:srgbClr val="00B050"/>
                 </a:solidFill>
               </a:rPr>
               <a:t>()</a:t>
             </a:r>
-            <a:endParaRPr lang="en-US" sz="1400" dirty="0">
-              <a:solidFill>
-                <a:srgbClr val="00B050"/>
-              </a:solidFill>
-            </a:endParaRPr>
           </a:p>
         </p:txBody>
       </p:sp>
@@ -5826,18 +5783,13 @@
           <a:p>
             <a:pPr algn="r"/>
             <a:r>
-              <a:rPr lang="en-US" sz="1400" dirty="0" smtClean="0">
+              <a:rPr lang="en-US" sz="1400" dirty="0">
                 <a:solidFill>
                   <a:srgbClr val="00B050"/>
                 </a:solidFill>
               </a:rPr>
               <a:t>Update status bar</a:t>
             </a:r>
-            <a:endParaRPr lang="en-US" sz="1400" dirty="0">
-              <a:solidFill>
-                <a:srgbClr val="00B050"/>
-              </a:solidFill>
-            </a:endParaRPr>
           </a:p>
         </p:txBody>
       </p:sp>
@@ -6027,7 +5979,7 @@
           <a:lstStyle/>
           <a:p>
             <a:r>
-              <a:rPr lang="en-US" sz="1400" dirty="0" smtClean="0">
+              <a:rPr lang="en-US" sz="1400" dirty="0">
                 <a:solidFill>
                   <a:schemeClr val="accent6">
                     <a:lumMod val="75000"/>
@@ -6037,7 +5989,7 @@
               <a:t>Save </a:t>
             </a:r>
             <a:br>
-              <a:rPr lang="en-US" sz="1400" dirty="0" smtClean="0">
+              <a:rPr lang="en-US" sz="1400" dirty="0">
                 <a:solidFill>
                   <a:schemeClr val="accent6">
                     <a:lumMod val="75000"/>
@@ -6046,7 +5998,7 @@
               </a:rPr>
             </a:br>
             <a:r>
-              <a:rPr lang="en-US" sz="1400" dirty="0" smtClean="0">
+              <a:rPr lang="en-US" sz="1400" dirty="0">
                 <a:solidFill>
                   <a:schemeClr val="accent6">
                     <a:lumMod val="75000"/>
@@ -6055,13 +6007,6 @@
               </a:rPr>
               <a:t>to file</a:t>
             </a:r>
-            <a:endParaRPr lang="en-US" sz="1400" dirty="0">
-              <a:solidFill>
-                <a:schemeClr val="accent6">
-                  <a:lumMod val="75000"/>
-                </a:schemeClr>
-              </a:solidFill>
-            </a:endParaRPr>
           </a:p>
         </p:txBody>
       </p:sp>

</xml_diff>

<commit_message>
Update UG DG diagrams to reflect Event Manager
</commit_message>
<xml_diff>
--- a/docs/diagrams/HighLevelSequenceDiagrams.pptx
+++ b/docs/diagrams/HighLevelSequenceDiagrams.pptx
@@ -107,6 +107,22 @@
       </a:defRPr>
     </a:lvl9pPr>
   </p:defaultTextStyle>
+  <p:extLst>
+    <p:ext uri="{EFAFB233-063F-42B5-8137-9DF3F51BA10A}">
+      <p15:sldGuideLst xmlns:p15="http://schemas.microsoft.com/office/powerpoint/2012/main">
+        <p15:guide id="1" orient="horz" pos="1488">
+          <p15:clr>
+            <a:srgbClr val="A4A3A4"/>
+          </p15:clr>
+        </p15:guide>
+        <p15:guide id="2" pos="2880">
+          <p15:clr>
+            <a:srgbClr val="A4A3A4"/>
+          </p15:clr>
+        </p15:guide>
+      </p15:sldGuideLst>
+    </p:ext>
+  </p:extLst>
 </p:presentation>
 </file>
 
@@ -192,7 +208,7 @@
           <a:p>
             <a:fld id="{F5CC4B3F-88C1-4FFA-B1B6-F41C21DC6924}" type="datetimeFigureOut">
               <a:rPr lang="en-US" smtClean="0"/>
-              <a:t>10/16/2016</a:t>
+              <a:t>11/2/18</a:t>
             </a:fld>
             <a:endParaRPr lang="en-US"/>
           </a:p>
@@ -256,38 +272,37 @@
           <a:p>
             <a:pPr lvl="0"/>
             <a:r>
-              <a:rPr lang="en-US" smtClean="0"/>
+              <a:rPr lang="en-US"/>
               <a:t>Click to edit Master text styles</a:t>
             </a:r>
           </a:p>
           <a:p>
             <a:pPr lvl="1"/>
             <a:r>
-              <a:rPr lang="en-US" smtClean="0"/>
+              <a:rPr lang="en-US"/>
               <a:t>Second level</a:t>
             </a:r>
           </a:p>
           <a:p>
             <a:pPr lvl="2"/>
             <a:r>
-              <a:rPr lang="en-US" smtClean="0"/>
+              <a:rPr lang="en-US"/>
               <a:t>Third level</a:t>
             </a:r>
           </a:p>
           <a:p>
             <a:pPr lvl="3"/>
             <a:r>
-              <a:rPr lang="en-US" smtClean="0"/>
+              <a:rPr lang="en-US"/>
               <a:t>Fourth level</a:t>
             </a:r>
           </a:p>
           <a:p>
             <a:pPr lvl="4"/>
             <a:r>
-              <a:rPr lang="en-US" smtClean="0"/>
+              <a:rPr lang="en-US"/>
               <a:t>Fifth level</a:t>
             </a:r>
-            <a:endParaRPr lang="en-US"/>
           </a:p>
         </p:txBody>
       </p:sp>
@@ -498,10 +513,9 @@
           <a:lstStyle/>
           <a:p>
             <a:r>
-              <a:rPr lang="en-US" smtClean="0"/>
+              <a:rPr lang="en-US"/>
               <a:t>Click to edit Master title style</a:t>
             </a:r>
-            <a:endParaRPr lang="en-US"/>
           </a:p>
         </p:txBody>
       </p:sp>
@@ -617,10 +631,9 @@
           </a:lstStyle>
           <a:p>
             <a:r>
-              <a:rPr lang="en-US" smtClean="0"/>
+              <a:rPr lang="en-US"/>
               <a:t>Click to edit Master subtitle style</a:t>
             </a:r>
-            <a:endParaRPr lang="en-US"/>
           </a:p>
         </p:txBody>
       </p:sp>
@@ -641,7 +654,7 @@
           <a:p>
             <a:fld id="{78C97017-6FC3-485B-9764-EAC9E56C1D49}" type="datetimeFigureOut">
               <a:rPr lang="en-US" smtClean="0"/>
-              <a:t>10/16/2016</a:t>
+              <a:t>11/2/18</a:t>
             </a:fld>
             <a:endParaRPr lang="en-US"/>
           </a:p>
@@ -735,10 +748,9 @@
           <a:lstStyle/>
           <a:p>
             <a:r>
-              <a:rPr lang="en-US" smtClean="0"/>
+              <a:rPr lang="en-US"/>
               <a:t>Click to edit Master title style</a:t>
             </a:r>
-            <a:endParaRPr lang="en-US"/>
           </a:p>
         </p:txBody>
       </p:sp>
@@ -759,38 +771,37 @@
           <a:p>
             <a:pPr lvl="0"/>
             <a:r>
-              <a:rPr lang="en-US" smtClean="0"/>
+              <a:rPr lang="en-US"/>
               <a:t>Click to edit Master text styles</a:t>
             </a:r>
           </a:p>
           <a:p>
             <a:pPr lvl="1"/>
             <a:r>
-              <a:rPr lang="en-US" smtClean="0"/>
+              <a:rPr lang="en-US"/>
               <a:t>Second level</a:t>
             </a:r>
           </a:p>
           <a:p>
             <a:pPr lvl="2"/>
             <a:r>
-              <a:rPr lang="en-US" smtClean="0"/>
+              <a:rPr lang="en-US"/>
               <a:t>Third level</a:t>
             </a:r>
           </a:p>
           <a:p>
             <a:pPr lvl="3"/>
             <a:r>
-              <a:rPr lang="en-US" smtClean="0"/>
+              <a:rPr lang="en-US"/>
               <a:t>Fourth level</a:t>
             </a:r>
           </a:p>
           <a:p>
             <a:pPr lvl="4"/>
             <a:r>
-              <a:rPr lang="en-US" smtClean="0"/>
+              <a:rPr lang="en-US"/>
               <a:t>Fifth level</a:t>
             </a:r>
-            <a:endParaRPr lang="en-US"/>
           </a:p>
         </p:txBody>
       </p:sp>
@@ -811,7 +822,7 @@
           <a:p>
             <a:fld id="{78C97017-6FC3-485B-9764-EAC9E56C1D49}" type="datetimeFigureOut">
               <a:rPr lang="en-US" smtClean="0"/>
-              <a:t>10/16/2016</a:t>
+              <a:t>11/2/18</a:t>
             </a:fld>
             <a:endParaRPr lang="en-US"/>
           </a:p>
@@ -910,10 +921,9 @@
           <a:lstStyle/>
           <a:p>
             <a:r>
-              <a:rPr lang="en-US" smtClean="0"/>
+              <a:rPr lang="en-US"/>
               <a:t>Click to edit Master title style</a:t>
             </a:r>
-            <a:endParaRPr lang="en-US"/>
           </a:p>
         </p:txBody>
       </p:sp>
@@ -939,38 +949,37 @@
           <a:p>
             <a:pPr lvl="0"/>
             <a:r>
-              <a:rPr lang="en-US" smtClean="0"/>
+              <a:rPr lang="en-US"/>
               <a:t>Click to edit Master text styles</a:t>
             </a:r>
           </a:p>
           <a:p>
             <a:pPr lvl="1"/>
             <a:r>
-              <a:rPr lang="en-US" smtClean="0"/>
+              <a:rPr lang="en-US"/>
               <a:t>Second level</a:t>
             </a:r>
           </a:p>
           <a:p>
             <a:pPr lvl="2"/>
             <a:r>
-              <a:rPr lang="en-US" smtClean="0"/>
+              <a:rPr lang="en-US"/>
               <a:t>Third level</a:t>
             </a:r>
           </a:p>
           <a:p>
             <a:pPr lvl="3"/>
             <a:r>
-              <a:rPr lang="en-US" smtClean="0"/>
+              <a:rPr lang="en-US"/>
               <a:t>Fourth level</a:t>
             </a:r>
           </a:p>
           <a:p>
             <a:pPr lvl="4"/>
             <a:r>
-              <a:rPr lang="en-US" smtClean="0"/>
+              <a:rPr lang="en-US"/>
               <a:t>Fifth level</a:t>
             </a:r>
-            <a:endParaRPr lang="en-US"/>
           </a:p>
         </p:txBody>
       </p:sp>
@@ -991,7 +1000,7 @@
           <a:p>
             <a:fld id="{78C97017-6FC3-485B-9764-EAC9E56C1D49}" type="datetimeFigureOut">
               <a:rPr lang="en-US" smtClean="0"/>
-              <a:t>10/16/2016</a:t>
+              <a:t>11/2/18</a:t>
             </a:fld>
             <a:endParaRPr lang="en-US"/>
           </a:p>
@@ -1085,10 +1094,9 @@
           <a:lstStyle/>
           <a:p>
             <a:r>
-              <a:rPr lang="en-US" smtClean="0"/>
+              <a:rPr lang="en-US"/>
               <a:t>Click to edit Master title style</a:t>
             </a:r>
-            <a:endParaRPr lang="en-US"/>
           </a:p>
         </p:txBody>
       </p:sp>
@@ -1109,38 +1117,37 @@
           <a:p>
             <a:pPr lvl="0"/>
             <a:r>
-              <a:rPr lang="en-US" smtClean="0"/>
+              <a:rPr lang="en-US"/>
               <a:t>Click to edit Master text styles</a:t>
             </a:r>
           </a:p>
           <a:p>
             <a:pPr lvl="1"/>
             <a:r>
-              <a:rPr lang="en-US" smtClean="0"/>
+              <a:rPr lang="en-US"/>
               <a:t>Second level</a:t>
             </a:r>
           </a:p>
           <a:p>
             <a:pPr lvl="2"/>
             <a:r>
-              <a:rPr lang="en-US" smtClean="0"/>
+              <a:rPr lang="en-US"/>
               <a:t>Third level</a:t>
             </a:r>
           </a:p>
           <a:p>
             <a:pPr lvl="3"/>
             <a:r>
-              <a:rPr lang="en-US" smtClean="0"/>
+              <a:rPr lang="en-US"/>
               <a:t>Fourth level</a:t>
             </a:r>
           </a:p>
           <a:p>
             <a:pPr lvl="4"/>
             <a:r>
-              <a:rPr lang="en-US" smtClean="0"/>
+              <a:rPr lang="en-US"/>
               <a:t>Fifth level</a:t>
             </a:r>
-            <a:endParaRPr lang="en-US"/>
           </a:p>
         </p:txBody>
       </p:sp>
@@ -1161,7 +1168,7 @@
           <a:p>
             <a:fld id="{78C97017-6FC3-485B-9764-EAC9E56C1D49}" type="datetimeFigureOut">
               <a:rPr lang="en-US" smtClean="0"/>
-              <a:t>10/16/2016</a:t>
+              <a:t>11/2/18</a:t>
             </a:fld>
             <a:endParaRPr lang="en-US"/>
           </a:p>
@@ -1264,10 +1271,9 @@
           </a:lstStyle>
           <a:p>
             <a:r>
-              <a:rPr lang="en-US" smtClean="0"/>
+              <a:rPr lang="en-US"/>
               <a:t>Click to edit Master title style</a:t>
             </a:r>
-            <a:endParaRPr lang="en-US"/>
           </a:p>
         </p:txBody>
       </p:sp>
@@ -1384,7 +1390,7 @@
           <a:p>
             <a:pPr lvl="0"/>
             <a:r>
-              <a:rPr lang="en-US" smtClean="0"/>
+              <a:rPr lang="en-US"/>
               <a:t>Click to edit Master text styles</a:t>
             </a:r>
           </a:p>
@@ -1407,7 +1413,7 @@
           <a:p>
             <a:fld id="{78C97017-6FC3-485B-9764-EAC9E56C1D49}" type="datetimeFigureOut">
               <a:rPr lang="en-US" smtClean="0"/>
-              <a:t>10/16/2016</a:t>
+              <a:t>11/2/18</a:t>
             </a:fld>
             <a:endParaRPr lang="en-US"/>
           </a:p>
@@ -1501,10 +1507,9 @@
           <a:lstStyle/>
           <a:p>
             <a:r>
-              <a:rPr lang="en-US" smtClean="0"/>
+              <a:rPr lang="en-US"/>
               <a:t>Click to edit Master title style</a:t>
             </a:r>
-            <a:endParaRPr lang="en-US"/>
           </a:p>
         </p:txBody>
       </p:sp>
@@ -1558,38 +1563,37 @@
           <a:p>
             <a:pPr lvl="0"/>
             <a:r>
-              <a:rPr lang="en-US" smtClean="0"/>
+              <a:rPr lang="en-US"/>
               <a:t>Click to edit Master text styles</a:t>
             </a:r>
           </a:p>
           <a:p>
             <a:pPr lvl="1"/>
             <a:r>
-              <a:rPr lang="en-US" smtClean="0"/>
+              <a:rPr lang="en-US"/>
               <a:t>Second level</a:t>
             </a:r>
           </a:p>
           <a:p>
             <a:pPr lvl="2"/>
             <a:r>
-              <a:rPr lang="en-US" smtClean="0"/>
+              <a:rPr lang="en-US"/>
               <a:t>Third level</a:t>
             </a:r>
           </a:p>
           <a:p>
             <a:pPr lvl="3"/>
             <a:r>
-              <a:rPr lang="en-US" smtClean="0"/>
+              <a:rPr lang="en-US"/>
               <a:t>Fourth level</a:t>
             </a:r>
           </a:p>
           <a:p>
             <a:pPr lvl="4"/>
             <a:r>
-              <a:rPr lang="en-US" smtClean="0"/>
+              <a:rPr lang="en-US"/>
               <a:t>Fifth level</a:t>
             </a:r>
-            <a:endParaRPr lang="en-US"/>
           </a:p>
         </p:txBody>
       </p:sp>
@@ -1643,38 +1647,37 @@
           <a:p>
             <a:pPr lvl="0"/>
             <a:r>
-              <a:rPr lang="en-US" smtClean="0"/>
+              <a:rPr lang="en-US"/>
               <a:t>Click to edit Master text styles</a:t>
             </a:r>
           </a:p>
           <a:p>
             <a:pPr lvl="1"/>
             <a:r>
-              <a:rPr lang="en-US" smtClean="0"/>
+              <a:rPr lang="en-US"/>
               <a:t>Second level</a:t>
             </a:r>
           </a:p>
           <a:p>
             <a:pPr lvl="2"/>
             <a:r>
-              <a:rPr lang="en-US" smtClean="0"/>
+              <a:rPr lang="en-US"/>
               <a:t>Third level</a:t>
             </a:r>
           </a:p>
           <a:p>
             <a:pPr lvl="3"/>
             <a:r>
-              <a:rPr lang="en-US" smtClean="0"/>
+              <a:rPr lang="en-US"/>
               <a:t>Fourth level</a:t>
             </a:r>
           </a:p>
           <a:p>
             <a:pPr lvl="4"/>
             <a:r>
-              <a:rPr lang="en-US" smtClean="0"/>
+              <a:rPr lang="en-US"/>
               <a:t>Fifth level</a:t>
             </a:r>
-            <a:endParaRPr lang="en-US"/>
           </a:p>
         </p:txBody>
       </p:sp>
@@ -1695,7 +1698,7 @@
           <a:p>
             <a:fld id="{78C97017-6FC3-485B-9764-EAC9E56C1D49}" type="datetimeFigureOut">
               <a:rPr lang="en-US" smtClean="0"/>
-              <a:t>10/16/2016</a:t>
+              <a:t>11/2/18</a:t>
             </a:fld>
             <a:endParaRPr lang="en-US"/>
           </a:p>
@@ -1793,10 +1796,9 @@
           </a:lstStyle>
           <a:p>
             <a:r>
-              <a:rPr lang="en-US" smtClean="0"/>
+              <a:rPr lang="en-US"/>
               <a:t>Click to edit Master title style</a:t>
             </a:r>
-            <a:endParaRPr lang="en-US"/>
           </a:p>
         </p:txBody>
       </p:sp>
@@ -1859,7 +1861,7 @@
           <a:p>
             <a:pPr lvl="0"/>
             <a:r>
-              <a:rPr lang="en-US" smtClean="0"/>
+              <a:rPr lang="en-US"/>
               <a:t>Click to edit Master text styles</a:t>
             </a:r>
           </a:p>
@@ -1915,38 +1917,37 @@
           <a:p>
             <a:pPr lvl="0"/>
             <a:r>
-              <a:rPr lang="en-US" smtClean="0"/>
+              <a:rPr lang="en-US"/>
               <a:t>Click to edit Master text styles</a:t>
             </a:r>
           </a:p>
           <a:p>
             <a:pPr lvl="1"/>
             <a:r>
-              <a:rPr lang="en-US" smtClean="0"/>
+              <a:rPr lang="en-US"/>
               <a:t>Second level</a:t>
             </a:r>
           </a:p>
           <a:p>
             <a:pPr lvl="2"/>
             <a:r>
-              <a:rPr lang="en-US" smtClean="0"/>
+              <a:rPr lang="en-US"/>
               <a:t>Third level</a:t>
             </a:r>
           </a:p>
           <a:p>
             <a:pPr lvl="3"/>
             <a:r>
-              <a:rPr lang="en-US" smtClean="0"/>
+              <a:rPr lang="en-US"/>
               <a:t>Fourth level</a:t>
             </a:r>
           </a:p>
           <a:p>
             <a:pPr lvl="4"/>
             <a:r>
-              <a:rPr lang="en-US" smtClean="0"/>
+              <a:rPr lang="en-US"/>
               <a:t>Fifth level</a:t>
             </a:r>
-            <a:endParaRPr lang="en-US"/>
           </a:p>
         </p:txBody>
       </p:sp>
@@ -2009,7 +2010,7 @@
           <a:p>
             <a:pPr lvl="0"/>
             <a:r>
-              <a:rPr lang="en-US" smtClean="0"/>
+              <a:rPr lang="en-US"/>
               <a:t>Click to edit Master text styles</a:t>
             </a:r>
           </a:p>
@@ -2065,38 +2066,37 @@
           <a:p>
             <a:pPr lvl="0"/>
             <a:r>
-              <a:rPr lang="en-US" smtClean="0"/>
+              <a:rPr lang="en-US"/>
               <a:t>Click to edit Master text styles</a:t>
             </a:r>
           </a:p>
           <a:p>
             <a:pPr lvl="1"/>
             <a:r>
-              <a:rPr lang="en-US" smtClean="0"/>
+              <a:rPr lang="en-US"/>
               <a:t>Second level</a:t>
             </a:r>
           </a:p>
           <a:p>
             <a:pPr lvl="2"/>
             <a:r>
-              <a:rPr lang="en-US" smtClean="0"/>
+              <a:rPr lang="en-US"/>
               <a:t>Third level</a:t>
             </a:r>
           </a:p>
           <a:p>
             <a:pPr lvl="3"/>
             <a:r>
-              <a:rPr lang="en-US" smtClean="0"/>
+              <a:rPr lang="en-US"/>
               <a:t>Fourth level</a:t>
             </a:r>
           </a:p>
           <a:p>
             <a:pPr lvl="4"/>
             <a:r>
-              <a:rPr lang="en-US" smtClean="0"/>
+              <a:rPr lang="en-US"/>
               <a:t>Fifth level</a:t>
             </a:r>
-            <a:endParaRPr lang="en-US"/>
           </a:p>
         </p:txBody>
       </p:sp>
@@ -2117,7 +2117,7 @@
           <a:p>
             <a:fld id="{78C97017-6FC3-485B-9764-EAC9E56C1D49}" type="datetimeFigureOut">
               <a:rPr lang="en-US" smtClean="0"/>
-              <a:t>10/16/2016</a:t>
+              <a:t>11/2/18</a:t>
             </a:fld>
             <a:endParaRPr lang="en-US"/>
           </a:p>
@@ -2211,10 +2211,9 @@
           <a:lstStyle/>
           <a:p>
             <a:r>
-              <a:rPr lang="en-US" smtClean="0"/>
+              <a:rPr lang="en-US"/>
               <a:t>Click to edit Master title style</a:t>
             </a:r>
-            <a:endParaRPr lang="en-US"/>
           </a:p>
         </p:txBody>
       </p:sp>
@@ -2235,7 +2234,7 @@
           <a:p>
             <a:fld id="{78C97017-6FC3-485B-9764-EAC9E56C1D49}" type="datetimeFigureOut">
               <a:rPr lang="en-US" smtClean="0"/>
-              <a:t>10/16/2016</a:t>
+              <a:t>11/2/18</a:t>
             </a:fld>
             <a:endParaRPr lang="en-US"/>
           </a:p>
@@ -2330,7 +2329,7 @@
           <a:p>
             <a:fld id="{78C97017-6FC3-485B-9764-EAC9E56C1D49}" type="datetimeFigureOut">
               <a:rPr lang="en-US" smtClean="0"/>
-              <a:t>10/16/2016</a:t>
+              <a:t>11/2/18</a:t>
             </a:fld>
             <a:endParaRPr lang="en-US"/>
           </a:p>
@@ -2433,10 +2432,9 @@
           </a:lstStyle>
           <a:p>
             <a:r>
-              <a:rPr lang="en-US" smtClean="0"/>
+              <a:rPr lang="en-US"/>
               <a:t>Click to edit Master title style</a:t>
             </a:r>
-            <a:endParaRPr lang="en-US"/>
           </a:p>
         </p:txBody>
       </p:sp>
@@ -2490,38 +2488,37 @@
           <a:p>
             <a:pPr lvl="0"/>
             <a:r>
-              <a:rPr lang="en-US" smtClean="0"/>
+              <a:rPr lang="en-US"/>
               <a:t>Click to edit Master text styles</a:t>
             </a:r>
           </a:p>
           <a:p>
             <a:pPr lvl="1"/>
             <a:r>
-              <a:rPr lang="en-US" smtClean="0"/>
+              <a:rPr lang="en-US"/>
               <a:t>Second level</a:t>
             </a:r>
           </a:p>
           <a:p>
             <a:pPr lvl="2"/>
             <a:r>
-              <a:rPr lang="en-US" smtClean="0"/>
+              <a:rPr lang="en-US"/>
               <a:t>Third level</a:t>
             </a:r>
           </a:p>
           <a:p>
             <a:pPr lvl="3"/>
             <a:r>
-              <a:rPr lang="en-US" smtClean="0"/>
+              <a:rPr lang="en-US"/>
               <a:t>Fourth level</a:t>
             </a:r>
           </a:p>
           <a:p>
             <a:pPr lvl="4"/>
             <a:r>
-              <a:rPr lang="en-US" smtClean="0"/>
+              <a:rPr lang="en-US"/>
               <a:t>Fifth level</a:t>
             </a:r>
-            <a:endParaRPr lang="en-US"/>
           </a:p>
         </p:txBody>
       </p:sp>
@@ -2584,7 +2581,7 @@
           <a:p>
             <a:pPr lvl="0"/>
             <a:r>
-              <a:rPr lang="en-US" smtClean="0"/>
+              <a:rPr lang="en-US"/>
               <a:t>Click to edit Master text styles</a:t>
             </a:r>
           </a:p>
@@ -2607,7 +2604,7 @@
           <a:p>
             <a:fld id="{78C97017-6FC3-485B-9764-EAC9E56C1D49}" type="datetimeFigureOut">
               <a:rPr lang="en-US" smtClean="0"/>
-              <a:t>10/16/2016</a:t>
+              <a:t>11/2/18</a:t>
             </a:fld>
             <a:endParaRPr lang="en-US"/>
           </a:p>
@@ -2710,10 +2707,9 @@
           </a:lstStyle>
           <a:p>
             <a:r>
-              <a:rPr lang="en-US" smtClean="0"/>
+              <a:rPr lang="en-US"/>
               <a:t>Click to edit Master title style</a:t>
             </a:r>
-            <a:endParaRPr lang="en-US"/>
           </a:p>
         </p:txBody>
       </p:sp>
@@ -2837,7 +2833,7 @@
           <a:p>
             <a:pPr lvl="0"/>
             <a:r>
-              <a:rPr lang="en-US" smtClean="0"/>
+              <a:rPr lang="en-US"/>
               <a:t>Click to edit Master text styles</a:t>
             </a:r>
           </a:p>
@@ -2860,7 +2856,7 @@
           <a:p>
             <a:fld id="{78C97017-6FC3-485B-9764-EAC9E56C1D49}" type="datetimeFigureOut">
               <a:rPr lang="en-US" smtClean="0"/>
-              <a:t>10/16/2016</a:t>
+              <a:t>11/2/18</a:t>
             </a:fld>
             <a:endParaRPr lang="en-US"/>
           </a:p>
@@ -2969,10 +2965,9 @@
           <a:lstStyle/>
           <a:p>
             <a:r>
-              <a:rPr lang="en-US" smtClean="0"/>
+              <a:rPr lang="en-US"/>
               <a:t>Click to edit Master title style</a:t>
             </a:r>
-            <a:endParaRPr lang="en-US"/>
           </a:p>
         </p:txBody>
       </p:sp>
@@ -3003,38 +2998,37 @@
           <a:p>
             <a:pPr lvl="0"/>
             <a:r>
-              <a:rPr lang="en-US" smtClean="0"/>
+              <a:rPr lang="en-US"/>
               <a:t>Click to edit Master text styles</a:t>
             </a:r>
           </a:p>
           <a:p>
             <a:pPr lvl="1"/>
             <a:r>
-              <a:rPr lang="en-US" smtClean="0"/>
+              <a:rPr lang="en-US"/>
               <a:t>Second level</a:t>
             </a:r>
           </a:p>
           <a:p>
             <a:pPr lvl="2"/>
             <a:r>
-              <a:rPr lang="en-US" smtClean="0"/>
+              <a:rPr lang="en-US"/>
               <a:t>Third level</a:t>
             </a:r>
           </a:p>
           <a:p>
             <a:pPr lvl="3"/>
             <a:r>
-              <a:rPr lang="en-US" smtClean="0"/>
+              <a:rPr lang="en-US"/>
               <a:t>Fourth level</a:t>
             </a:r>
           </a:p>
           <a:p>
             <a:pPr lvl="4"/>
             <a:r>
-              <a:rPr lang="en-US" smtClean="0"/>
+              <a:rPr lang="en-US"/>
               <a:t>Fifth level</a:t>
             </a:r>
-            <a:endParaRPr lang="en-US"/>
           </a:p>
         </p:txBody>
       </p:sp>
@@ -3073,7 +3067,7 @@
           <a:p>
             <a:fld id="{78C97017-6FC3-485B-9764-EAC9E56C1D49}" type="datetimeFigureOut">
               <a:rPr lang="en-US" smtClean="0"/>
-              <a:t>10/16/2016</a:t>
+              <a:t>11/2/18</a:t>
             </a:fld>
             <a:endParaRPr lang="en-US"/>
           </a:p>
@@ -3492,7 +3486,7 @@
           <a:p>
             <a:pPr algn="ctr"/>
             <a:r>
-              <a:rPr lang="en-US" sz="1600" dirty="0" smtClean="0">
+              <a:rPr lang="en-US" sz="1600" dirty="0">
                 <a:solidFill>
                   <a:schemeClr val="bg1"/>
                 </a:solidFill>
@@ -3856,7 +3850,7 @@
           <a:p>
             <a:pPr algn="ctr"/>
             <a:r>
-              <a:rPr lang="en-US" sz="1600" dirty="0" smtClean="0">
+              <a:rPr lang="en-US" sz="1600" dirty="0">
                 <a:solidFill>
                   <a:schemeClr val="bg1"/>
                 </a:solidFill>
@@ -4003,7 +3997,7 @@
           <a:p>
             <a:pPr algn="ctr"/>
             <a:r>
-              <a:rPr lang="en-US" sz="1600" dirty="0" smtClean="0">
+              <a:rPr lang="en-US" sz="1600" dirty="0">
                 <a:solidFill>
                   <a:schemeClr val="bg1"/>
                 </a:solidFill>
@@ -4165,10 +4159,9 @@
           <a:lstStyle/>
           <a:p>
             <a:r>
-              <a:rPr lang="en-US" sz="1400" dirty="0" smtClean="0"/>
+              <a:rPr lang="en-US" sz="1400" dirty="0"/>
               <a:t>delete 1</a:t>
             </a:r>
-            <a:endParaRPr lang="en-US" sz="1400" dirty="0"/>
           </a:p>
         </p:txBody>
       </p:sp>
@@ -4231,18 +4224,13 @@
           <a:lstStyle/>
           <a:p>
             <a:r>
-              <a:rPr lang="en-US" sz="1400" dirty="0" smtClean="0">
+              <a:rPr lang="en-US" sz="1400" dirty="0">
                 <a:solidFill>
                   <a:srgbClr val="0070C0"/>
                 </a:solidFill>
               </a:rPr>
               <a:t>execute(“delete 1”)</a:t>
             </a:r>
-            <a:endParaRPr lang="en-US" sz="1400" dirty="0">
-              <a:solidFill>
-                <a:srgbClr val="0070C0"/>
-              </a:solidFill>
-            </a:endParaRPr>
           </a:p>
         </p:txBody>
       </p:sp>
@@ -4305,26 +4293,21 @@
           <a:lstStyle/>
           <a:p>
             <a:r>
-              <a:rPr lang="en-US" sz="1400" dirty="0" err="1" smtClean="0">
+              <a:rPr lang="en-US" sz="1400" dirty="0" err="1">
                 <a:solidFill>
                   <a:srgbClr val="7030A0"/>
                 </a:solidFill>
               </a:rPr>
-              <a:t>deletePerson</a:t>
-            </a:r>
-            <a:r>
-              <a:rPr lang="en-US" sz="1400" dirty="0" smtClean="0">
+              <a:t>deleteEvent</a:t>
+            </a:r>
+            <a:r>
+              <a:rPr lang="en-US" sz="1400" dirty="0">
                 <a:solidFill>
                   <a:srgbClr val="7030A0"/>
                 </a:solidFill>
               </a:rPr>
               <a:t>(p)</a:t>
             </a:r>
-            <a:endParaRPr lang="en-US" sz="1400" dirty="0">
-              <a:solidFill>
-                <a:srgbClr val="7030A0"/>
-              </a:solidFill>
-            </a:endParaRPr>
           </a:p>
         </p:txBody>
       </p:sp>
@@ -4337,7 +4320,7 @@
         <p:spPr>
           <a:xfrm>
             <a:off x="6074030" y="1687656"/>
-            <a:ext cx="2438400" cy="215444"/>
+            <a:ext cx="2438400" cy="200055"/>
           </a:xfrm>
           <a:prstGeom prst="rect">
             <a:avLst/>
@@ -4351,27 +4334,27 @@
           <a:lstStyle/>
           <a:p>
             <a:r>
-              <a:rPr lang="en-US" sz="1400" dirty="0" smtClean="0">
+              <a:rPr lang="en-US" sz="1300" dirty="0">
                 <a:solidFill>
                   <a:schemeClr val="accent5">
                     <a:lumMod val="75000"/>
                   </a:schemeClr>
                 </a:solidFill>
               </a:rPr>
-              <a:t>post(</a:t>
-            </a:r>
-            <a:r>
-              <a:rPr lang="en-US" sz="1400" dirty="0" err="1" smtClean="0">
+              <a:t>Post(</a:t>
+            </a:r>
+            <a:r>
+              <a:rPr lang="en-US" sz="1300" dirty="0" err="1">
                 <a:solidFill>
                   <a:schemeClr val="accent5">
                     <a:lumMod val="75000"/>
                   </a:schemeClr>
                 </a:solidFill>
               </a:rPr>
-              <a:t>AddressBookChangedEvent</a:t>
-            </a:r>
-            <a:r>
-              <a:rPr lang="en-US" sz="1400" dirty="0" smtClean="0">
+              <a:t>EventManagerChangedEvent</a:t>
+            </a:r>
+            <a:r>
+              <a:rPr lang="en-US" sz="1300" dirty="0">
                 <a:solidFill>
                   <a:schemeClr val="accent5">
                     <a:lumMod val="75000"/>
@@ -4380,13 +4363,6 @@
               </a:rPr>
               <a:t>)</a:t>
             </a:r>
-            <a:endParaRPr lang="en-US" sz="1400" dirty="0">
-              <a:solidFill>
-                <a:schemeClr val="accent5">
-                  <a:lumMod val="75000"/>
-                </a:schemeClr>
-              </a:solidFill>
-            </a:endParaRPr>
           </a:p>
         </p:txBody>
       </p:sp>
@@ -4552,7 +4528,7 @@
           <a:p>
             <a:pPr algn="ctr"/>
             <a:r>
-              <a:rPr lang="en-US" sz="1600" dirty="0" smtClean="0">
+              <a:rPr lang="en-US" sz="1600" dirty="0">
                 <a:solidFill>
                   <a:schemeClr val="bg1"/>
                 </a:solidFill>
@@ -4560,7 +4536,7 @@
               <a:t>:</a:t>
             </a:r>
             <a:r>
-              <a:rPr lang="en-US" sz="1600" dirty="0" err="1" smtClean="0">
+              <a:rPr lang="en-US" sz="1600" dirty="0" err="1">
                 <a:solidFill>
                   <a:schemeClr val="bg1"/>
                 </a:solidFill>
@@ -4793,7 +4769,7 @@
           <a:p>
             <a:pPr algn="ctr"/>
             <a:r>
-              <a:rPr lang="en-US" sz="1600" dirty="0" smtClean="0">
+              <a:rPr lang="en-US" sz="1600" dirty="0">
                 <a:solidFill>
                   <a:schemeClr val="bg1"/>
                 </a:solidFill>
@@ -4925,7 +4901,7 @@
           <a:lstStyle/>
           <a:p>
             <a:r>
-              <a:rPr lang="en-US" sz="1400" dirty="0" smtClean="0">
+              <a:rPr lang="en-US" sz="1400" dirty="0">
                 <a:solidFill>
                   <a:schemeClr val="accent5">
                     <a:lumMod val="75000"/>
@@ -4935,17 +4911,17 @@
               <a:t>post(</a:t>
             </a:r>
             <a:r>
-              <a:rPr lang="en-US" sz="1400" dirty="0" err="1" smtClean="0">
+              <a:rPr lang="en-US" sz="1400" dirty="0" err="1">
                 <a:solidFill>
                   <a:schemeClr val="accent5">
                     <a:lumMod val="75000"/>
                   </a:schemeClr>
                 </a:solidFill>
               </a:rPr>
-              <a:t>AddressBookChangedEvent</a:t>
-            </a:r>
-            <a:r>
-              <a:rPr lang="en-US" sz="1400" dirty="0" smtClean="0">
+              <a:t>EventManagerChangedEvent</a:t>
+            </a:r>
+            <a:r>
+              <a:rPr lang="en-US" sz="1400" dirty="0">
                 <a:solidFill>
                   <a:schemeClr val="accent5">
                     <a:lumMod val="75000"/>
@@ -4954,13 +4930,6 @@
               </a:rPr>
               <a:t>)</a:t>
             </a:r>
-            <a:endParaRPr lang="en-US" sz="1400" dirty="0">
-              <a:solidFill>
-                <a:schemeClr val="accent5">
-                  <a:lumMod val="75000"/>
-                </a:schemeClr>
-              </a:solidFill>
-            </a:endParaRPr>
           </a:p>
         </p:txBody>
       </p:sp>
@@ -5052,7 +5021,7 @@
           <a:p>
             <a:pPr algn="ctr"/>
             <a:r>
-              <a:rPr lang="en-US" sz="1600" dirty="0" smtClean="0">
+              <a:rPr lang="en-US" sz="1600" dirty="0">
                 <a:solidFill>
                   <a:schemeClr val="bg1"/>
                 </a:solidFill>
@@ -5060,7 +5029,7 @@
               <a:t>:</a:t>
             </a:r>
             <a:r>
-              <a:rPr lang="en-US" sz="1600" dirty="0" err="1" smtClean="0">
+              <a:rPr lang="en-US" sz="1600" dirty="0" err="1">
                 <a:solidFill>
                   <a:schemeClr val="bg1"/>
                 </a:solidFill>
@@ -5293,7 +5262,7 @@
         <p:spPr>
           <a:xfrm>
             <a:off x="5036330" y="5065911"/>
-            <a:ext cx="2659870" cy="215444"/>
+            <a:ext cx="2659870" cy="430887"/>
           </a:xfrm>
           <a:prstGeom prst="rect">
             <a:avLst/>
@@ -5307,17 +5276,17 @@
           <a:lstStyle/>
           <a:p>
             <a:r>
-              <a:rPr lang="en-US" sz="1400" dirty="0" err="1" smtClean="0">
+              <a:rPr lang="en-US" sz="1400">
                 <a:solidFill>
                   <a:schemeClr val="accent6">
                     <a:lumMod val="75000"/>
                   </a:schemeClr>
                 </a:solidFill>
               </a:rPr>
-              <a:t>handleAddresssBookChangedEvent</a:t>
-            </a:r>
-            <a:r>
-              <a:rPr lang="en-US" sz="1400" dirty="0" smtClean="0">
+              <a:t>handleEventManagerChangedEvent</a:t>
+            </a:r>
+            <a:r>
+              <a:rPr lang="en-US" sz="1400" dirty="0">
                 <a:solidFill>
                   <a:schemeClr val="accent6">
                     <a:lumMod val="75000"/>
@@ -5326,13 +5295,6 @@
               </a:rPr>
               <a:t>()</a:t>
             </a:r>
-            <a:endParaRPr lang="en-US" sz="1400" dirty="0">
-              <a:solidFill>
-                <a:schemeClr val="accent6">
-                  <a:lumMod val="75000"/>
-                </a:schemeClr>
-              </a:solidFill>
-            </a:endParaRPr>
           </a:p>
         </p:txBody>
       </p:sp>
@@ -5417,7 +5379,7 @@
           <a:p>
             <a:pPr algn="ctr"/>
             <a:r>
-              <a:rPr lang="en-US" sz="1600" dirty="0" smtClean="0">
+              <a:rPr lang="en-US" sz="1600" dirty="0">
                 <a:solidFill>
                   <a:schemeClr val="bg1"/>
                 </a:solidFill>
@@ -5606,7 +5568,7 @@
         <p:spPr>
           <a:xfrm>
             <a:off x="1416276" y="5395369"/>
-            <a:ext cx="2659870" cy="215444"/>
+            <a:ext cx="2659870" cy="430887"/>
           </a:xfrm>
           <a:prstGeom prst="rect">
             <a:avLst/>
@@ -5620,26 +5582,21 @@
           <a:lstStyle/>
           <a:p>
             <a:r>
-              <a:rPr lang="en-US" sz="1400" dirty="0" err="1" smtClean="0">
+              <a:rPr lang="en-US" sz="1400" dirty="0" err="1">
                 <a:solidFill>
                   <a:srgbClr val="00B050"/>
                 </a:solidFill>
               </a:rPr>
-              <a:t>handleAddresssBookChangedEvent</a:t>
-            </a:r>
-            <a:r>
-              <a:rPr lang="en-US" sz="1400" dirty="0" smtClean="0">
+              <a:t>handleEventManagerChangedEvent</a:t>
+            </a:r>
+            <a:r>
+              <a:rPr lang="en-US" sz="1400" dirty="0">
                 <a:solidFill>
                   <a:srgbClr val="00B050"/>
                 </a:solidFill>
               </a:rPr>
               <a:t>()</a:t>
             </a:r>
-            <a:endParaRPr lang="en-US" sz="1400" dirty="0">
-              <a:solidFill>
-                <a:srgbClr val="00B050"/>
-              </a:solidFill>
-            </a:endParaRPr>
           </a:p>
         </p:txBody>
       </p:sp>
@@ -5826,18 +5783,13 @@
           <a:p>
             <a:pPr algn="r"/>
             <a:r>
-              <a:rPr lang="en-US" sz="1400" dirty="0" smtClean="0">
+              <a:rPr lang="en-US" sz="1400" dirty="0">
                 <a:solidFill>
                   <a:srgbClr val="00B050"/>
                 </a:solidFill>
               </a:rPr>
               <a:t>Update status bar</a:t>
             </a:r>
-            <a:endParaRPr lang="en-US" sz="1400" dirty="0">
-              <a:solidFill>
-                <a:srgbClr val="00B050"/>
-              </a:solidFill>
-            </a:endParaRPr>
           </a:p>
         </p:txBody>
       </p:sp>
@@ -6027,7 +5979,7 @@
           <a:lstStyle/>
           <a:p>
             <a:r>
-              <a:rPr lang="en-US" sz="1400" dirty="0" smtClean="0">
+              <a:rPr lang="en-US" sz="1400" dirty="0">
                 <a:solidFill>
                   <a:schemeClr val="accent6">
                     <a:lumMod val="75000"/>
@@ -6037,7 +5989,7 @@
               <a:t>Save </a:t>
             </a:r>
             <a:br>
-              <a:rPr lang="en-US" sz="1400" dirty="0" smtClean="0">
+              <a:rPr lang="en-US" sz="1400" dirty="0">
                 <a:solidFill>
                   <a:schemeClr val="accent6">
                     <a:lumMod val="75000"/>
@@ -6046,7 +5998,7 @@
               </a:rPr>
             </a:br>
             <a:r>
-              <a:rPr lang="en-US" sz="1400" dirty="0" smtClean="0">
+              <a:rPr lang="en-US" sz="1400" dirty="0">
                 <a:solidFill>
                   <a:schemeClr val="accent6">
                     <a:lumMod val="75000"/>
@@ -6055,13 +6007,6 @@
               </a:rPr>
               <a:t>to file</a:t>
             </a:r>
-            <a:endParaRPr lang="en-US" sz="1400" dirty="0">
-              <a:solidFill>
-                <a:schemeClr val="accent6">
-                  <a:lumMod val="75000"/>
-                </a:schemeClr>
-              </a:solidFill>
-            </a:endParaRPr>
           </a:p>
         </p:txBody>
       </p:sp>

</xml_diff>